<commit_message>
got logistical regressor to work
</commit_message>
<xml_diff>
--- a/report/final_project_presentation.pptx
+++ b/report/final_project_presentation.pptx
@@ -5,10 +5,10 @@
     <p:sldMasterId id="2147483648" r:id="rId4"/>
   </p:sldMasterIdLst>
   <p:notesMasterIdLst>
-    <p:notesMasterId r:id="rId19"/>
+    <p:notesMasterId r:id="rId20"/>
   </p:notesMasterIdLst>
   <p:handoutMasterIdLst>
-    <p:handoutMasterId r:id="rId20"/>
+    <p:handoutMasterId r:id="rId21"/>
   </p:handoutMasterIdLst>
   <p:sldIdLst>
     <p:sldId id="381" r:id="rId5"/>
@@ -22,9 +22,10 @@
     <p:sldId id="389" r:id="rId13"/>
     <p:sldId id="391" r:id="rId14"/>
     <p:sldId id="385" r:id="rId15"/>
-    <p:sldId id="394" r:id="rId16"/>
-    <p:sldId id="392" r:id="rId17"/>
-    <p:sldId id="393" r:id="rId18"/>
+    <p:sldId id="395" r:id="rId16"/>
+    <p:sldId id="394" r:id="rId17"/>
+    <p:sldId id="392" r:id="rId18"/>
+    <p:sldId id="393" r:id="rId19"/>
   </p:sldIdLst>
   <p:sldSz cx="14630400" cy="8229600"/>
   <p:notesSz cx="6858000" cy="9144000"/>
@@ -140,7 +141,7 @@
 <file path=ppt/revisionInfo.xml><?xml version="1.0" encoding="utf-8"?>
 <p1510:revInfo xmlns:a="http://schemas.openxmlformats.org/drawingml/2006/main" xmlns:r="http://schemas.openxmlformats.org/officeDocument/2006/relationships" xmlns:p1510="http://schemas.microsoft.com/office/powerpoint/2015/10/main">
   <p1510:revLst>
-    <p1510:client id="{2FAAE2C5-CFE8-422F-8487-0DD5CDB34916}" v="3206" dt="2024-12-03T20:19:30.018"/>
+    <p1510:client id="{2FAAE2C5-CFE8-422F-8487-0DD5CDB34916}" v="3264" dt="2024-12-04T17:01:10.930"/>
     <p1510:client id="{305B8E24-CECB-E4DE-8892-56AF96283C19}" v="3495" dt="2024-12-03T20:17:52.801"/>
   </p1510:revLst>
 </p1510:revInfo>
@@ -505,8 +506,8 @@
   </pc:docChgLst>
   <pc:docChgLst>
     <pc:chgData name="Jacob Tye" userId="65099887-eb74-45b6-990f-7b89b11dffe2" providerId="ADAL" clId="{2FAAE2C5-CFE8-422F-8487-0DD5CDB34916}"/>
-    <pc:docChg chg="undo redo custSel addSld delSld modSld">
-      <pc:chgData name="Jacob Tye" userId="65099887-eb74-45b6-990f-7b89b11dffe2" providerId="ADAL" clId="{2FAAE2C5-CFE8-422F-8487-0DD5CDB34916}" dt="2024-12-03T20:19:30.018" v="3260" actId="20577"/>
+    <pc:docChg chg="undo redo custSel addSld delSld modSld sldOrd">
+      <pc:chgData name="Jacob Tye" userId="65099887-eb74-45b6-990f-7b89b11dffe2" providerId="ADAL" clId="{2FAAE2C5-CFE8-422F-8487-0DD5CDB34916}" dt="2024-12-04T17:01:53.440" v="3476" actId="14826"/>
       <pc:docMkLst>
         <pc:docMk/>
       </pc:docMkLst>
@@ -1058,8 +1059,23 @@
           <pc:sldMk cId="2685935928" sldId="389"/>
         </pc:sldMkLst>
       </pc:sldChg>
+      <pc:sldChg chg="modSp mod">
+        <pc:chgData name="Jacob Tye" userId="65099887-eb74-45b6-990f-7b89b11dffe2" providerId="ADAL" clId="{2FAAE2C5-CFE8-422F-8487-0DD5CDB34916}" dt="2024-12-04T17:00:25.386" v="3416" actId="20577"/>
+        <pc:sldMkLst>
+          <pc:docMk/>
+          <pc:sldMk cId="1853433533" sldId="392"/>
+        </pc:sldMkLst>
+        <pc:spChg chg="mod">
+          <ac:chgData name="Jacob Tye" userId="65099887-eb74-45b6-990f-7b89b11dffe2" providerId="ADAL" clId="{2FAAE2C5-CFE8-422F-8487-0DD5CDB34916}" dt="2024-12-04T17:00:25.386" v="3416" actId="20577"/>
+          <ac:spMkLst>
+            <pc:docMk/>
+            <pc:sldMk cId="1853433533" sldId="392"/>
+            <ac:spMk id="2" creationId="{2E5D1A2E-2A8C-E4F9-D1F3-91987A3F29D7}"/>
+          </ac:spMkLst>
+        </pc:spChg>
+      </pc:sldChg>
       <pc:sldChg chg="addSp delSp modSp mod">
-        <pc:chgData name="Jacob Tye" userId="65099887-eb74-45b6-990f-7b89b11dffe2" providerId="ADAL" clId="{2FAAE2C5-CFE8-422F-8487-0DD5CDB34916}" dt="2024-12-03T20:17:36.557" v="3255" actId="26606"/>
+        <pc:chgData name="Jacob Tye" userId="65099887-eb74-45b6-990f-7b89b11dffe2" providerId="ADAL" clId="{2FAAE2C5-CFE8-422F-8487-0DD5CDB34916}" dt="2024-12-04T17:01:10.929" v="3473" actId="20577"/>
         <pc:sldMkLst>
           <pc:docMk/>
           <pc:sldMk cId="4234568240" sldId="393"/>
@@ -1088,8 +1104,8 @@
             <ac:spMk id="4" creationId="{92C57DBF-2469-1CC4-9CD4-CE0113F4C380}"/>
           </ac:spMkLst>
         </pc:spChg>
-        <pc:graphicFrameChg chg="add">
-          <ac:chgData name="Jacob Tye" userId="65099887-eb74-45b6-990f-7b89b11dffe2" providerId="ADAL" clId="{2FAAE2C5-CFE8-422F-8487-0DD5CDB34916}" dt="2024-12-03T20:17:36.557" v="3255" actId="26606"/>
+        <pc:graphicFrameChg chg="add mod">
+          <ac:chgData name="Jacob Tye" userId="65099887-eb74-45b6-990f-7b89b11dffe2" providerId="ADAL" clId="{2FAAE2C5-CFE8-422F-8487-0DD5CDB34916}" dt="2024-12-04T17:01:10.929" v="3473" actId="20577"/>
           <ac:graphicFrameMkLst>
             <pc:docMk/>
             <pc:sldMk cId="4234568240" sldId="393"/>
@@ -1098,7 +1114,7 @@
         </pc:graphicFrameChg>
       </pc:sldChg>
       <pc:sldChg chg="addSp delSp modSp add mod modNotesTx">
-        <pc:chgData name="Jacob Tye" userId="65099887-eb74-45b6-990f-7b89b11dffe2" providerId="ADAL" clId="{2FAAE2C5-CFE8-422F-8487-0DD5CDB34916}" dt="2024-12-03T20:19:30.018" v="3260" actId="20577"/>
+        <pc:chgData name="Jacob Tye" userId="65099887-eb74-45b6-990f-7b89b11dffe2" providerId="ADAL" clId="{2FAAE2C5-CFE8-422F-8487-0DD5CDB34916}" dt="2024-12-04T17:01:48.873" v="3475" actId="14826"/>
         <pc:sldMkLst>
           <pc:docMk/>
           <pc:sldMk cId="1089562007" sldId="394"/>
@@ -1160,7 +1176,7 @@
           </ac:picMkLst>
         </pc:picChg>
         <pc:picChg chg="add mod">
-          <ac:chgData name="Jacob Tye" userId="65099887-eb74-45b6-990f-7b89b11dffe2" providerId="ADAL" clId="{2FAAE2C5-CFE8-422F-8487-0DD5CDB34916}" dt="2024-12-03T20:07:04.612" v="2646" actId="1076"/>
+          <ac:chgData name="Jacob Tye" userId="65099887-eb74-45b6-990f-7b89b11dffe2" providerId="ADAL" clId="{2FAAE2C5-CFE8-422F-8487-0DD5CDB34916}" dt="2024-12-04T17:01:48.873" v="3475" actId="14826"/>
           <ac:picMkLst>
             <pc:docMk/>
             <pc:sldMk cId="1089562007" sldId="394"/>
@@ -1181,6 +1197,61 @@
             <pc:docMk/>
             <pc:sldMk cId="1089562007" sldId="394"/>
             <ac:picMk id="4098" creationId="{4057C456-D2F2-58A0-3992-243FA2606431}"/>
+          </ac:picMkLst>
+        </pc:picChg>
+      </pc:sldChg>
+      <pc:sldChg chg="modSp add mod ord">
+        <pc:chgData name="Jacob Tye" userId="65099887-eb74-45b6-990f-7b89b11dffe2" providerId="ADAL" clId="{2FAAE2C5-CFE8-422F-8487-0DD5CDB34916}" dt="2024-12-04T17:01:53.440" v="3476" actId="14826"/>
+        <pc:sldMkLst>
+          <pc:docMk/>
+          <pc:sldMk cId="4139828258" sldId="395"/>
+        </pc:sldMkLst>
+        <pc:spChg chg="mod">
+          <ac:chgData name="Jacob Tye" userId="65099887-eb74-45b6-990f-7b89b11dffe2" providerId="ADAL" clId="{2FAAE2C5-CFE8-422F-8487-0DD5CDB34916}" dt="2024-12-04T16:53:02.176" v="3292" actId="313"/>
+          <ac:spMkLst>
+            <pc:docMk/>
+            <pc:sldMk cId="4139828258" sldId="395"/>
+            <ac:spMk id="3" creationId="{00F0EABC-ED7A-CBD6-EB6F-8F3D06850CB0}"/>
+          </ac:spMkLst>
+        </pc:spChg>
+        <pc:spChg chg="mod">
+          <ac:chgData name="Jacob Tye" userId="65099887-eb74-45b6-990f-7b89b11dffe2" providerId="ADAL" clId="{2FAAE2C5-CFE8-422F-8487-0DD5CDB34916}" dt="2024-12-04T16:53:18.497" v="3297" actId="14100"/>
+          <ac:spMkLst>
+            <pc:docMk/>
+            <pc:sldMk cId="4139828258" sldId="395"/>
+            <ac:spMk id="13" creationId="{64DF857A-EE9E-CA92-F0D0-626B1D441FB6}"/>
+          </ac:spMkLst>
+        </pc:spChg>
+        <pc:graphicFrameChg chg="modGraphic">
+          <ac:chgData name="Jacob Tye" userId="65099887-eb74-45b6-990f-7b89b11dffe2" providerId="ADAL" clId="{2FAAE2C5-CFE8-422F-8487-0DD5CDB34916}" dt="2024-12-04T16:54:20.153" v="3366" actId="20577"/>
+          <ac:graphicFrameMkLst>
+            <pc:docMk/>
+            <pc:sldMk cId="4139828258" sldId="395"/>
+            <ac:graphicFrameMk id="10" creationId="{76F478D0-93BF-5650-3E1C-6149E8CB1D63}"/>
+          </ac:graphicFrameMkLst>
+        </pc:graphicFrameChg>
+        <pc:picChg chg="mod">
+          <ac:chgData name="Jacob Tye" userId="65099887-eb74-45b6-990f-7b89b11dffe2" providerId="ADAL" clId="{2FAAE2C5-CFE8-422F-8487-0DD5CDB34916}" dt="2024-12-04T16:53:35.040" v="3299" actId="14826"/>
+          <ac:picMkLst>
+            <pc:docMk/>
+            <pc:sldMk cId="4139828258" sldId="395"/>
+            <ac:picMk id="7" creationId="{5060E8B2-7E91-DAB6-2F97-92A467F0FC2D}"/>
+          </ac:picMkLst>
+        </pc:picChg>
+        <pc:picChg chg="mod">
+          <ac:chgData name="Jacob Tye" userId="65099887-eb74-45b6-990f-7b89b11dffe2" providerId="ADAL" clId="{2FAAE2C5-CFE8-422F-8487-0DD5CDB34916}" dt="2024-12-04T17:01:53.440" v="3476" actId="14826"/>
+          <ac:picMkLst>
+            <pc:docMk/>
+            <pc:sldMk cId="4139828258" sldId="395"/>
+            <ac:picMk id="12" creationId="{40BD095B-3F00-83E6-5BEE-A2C2EB41E406}"/>
+          </ac:picMkLst>
+        </pc:picChg>
+        <pc:picChg chg="mod">
+          <ac:chgData name="Jacob Tye" userId="65099887-eb74-45b6-990f-7b89b11dffe2" providerId="ADAL" clId="{2FAAE2C5-CFE8-422F-8487-0DD5CDB34916}" dt="2024-12-04T16:57:06.736" v="3367" actId="14826"/>
+          <ac:picMkLst>
+            <pc:docMk/>
+            <pc:sldMk cId="4139828258" sldId="395"/>
+            <ac:picMk id="15" creationId="{8FB0E844-DF75-D5AF-E92C-6C50E23880D1}"/>
           </ac:picMkLst>
         </pc:picChg>
       </pc:sldChg>
@@ -1962,7 +2033,7 @@
 <dgm:dataModel xmlns:dgm="http://schemas.openxmlformats.org/drawingml/2006/diagram" xmlns:a="http://schemas.openxmlformats.org/drawingml/2006/main">
   <dgm:ptLst>
     <dgm:pt modelId="{82B7062F-3274-4153-99F8-AE8A89EEE763}" type="doc">
-      <dgm:prSet loTypeId="urn:microsoft.com/office/officeart/2008/layout/LinedList" loCatId="list" qsTypeId="urn:microsoft.com/office/officeart/2005/8/quickstyle/simple1" qsCatId="simple" csTypeId="urn:microsoft.com/office/officeart/2005/8/colors/accent2_2" csCatId="accent2"/>
+      <dgm:prSet loTypeId="urn:microsoft.com/office/officeart/2008/layout/LinedList" loCatId="list" qsTypeId="urn:microsoft.com/office/officeart/2005/8/quickstyle/simple1" qsCatId="simple" csTypeId="urn:microsoft.com/office/officeart/2005/8/colors/accent2_2" csCatId="accent2" phldr="1"/>
       <dgm:spPr/>
       <dgm:t>
         <a:bodyPr/>
@@ -2140,10 +2211,10 @@
         <a:lstStyle/>
         <a:p>
           <a:r>
-            <a:rPr lang="en-US" b="0" i="0" baseline="0"/>
-            <a:t>To be usable, alternative means of interpretability may need to be explored when utilizing methylation data</a:t>
+            <a:rPr lang="en-US" b="0" i="0" baseline="0" dirty="0"/>
+            <a:t>To be usable, dimensionality reduction may not be necessary, or alternative means of interpretability may need to be explored when utilizing methylation data.</a:t>
           </a:r>
-          <a:endParaRPr lang="en-US"/>
+          <a:endParaRPr lang="en-US" dirty="0"/>
         </a:p>
       </dgm:t>
     </dgm:pt>
@@ -2862,10 +2933,10 @@
             <a:buNone/>
           </a:pPr>
           <a:r>
-            <a:rPr lang="en-US" sz="2400" b="0" i="0" kern="1200" baseline="0"/>
-            <a:t>To be usable, alternative means of interpretability may need to be explored when utilizing methylation data</a:t>
+            <a:rPr lang="en-US" sz="2400" b="0" i="0" kern="1200" baseline="0" dirty="0"/>
+            <a:t>To be usable, dimensionality reduction may not be necessary, or alternative means of interpretability may need to be explored when utilizing methylation data.</a:t>
           </a:r>
-          <a:endParaRPr lang="en-US" sz="2400" kern="1200"/>
+          <a:endParaRPr lang="en-US" sz="2400" kern="1200" dirty="0"/>
         </a:p>
       </dsp:txBody>
       <dsp:txXfrm>
@@ -4460,7 +4531,7 @@
             <a:fld id="{984B8A31-2B9F-A94B-A2CC-00F18DA57334}" type="datetimeFigureOut">
               <a:rPr lang="en-US" smtClean="0"/>
               <a:pPr/>
-              <a:t>12/3/2024</a:t>
+              <a:t>12/4/2024</a:t>
             </a:fld>
             <a:endParaRPr lang="en-US"/>
           </a:p>
@@ -4627,7 +4698,7 @@
             <a:fld id="{781EC66E-FACF-7F40-AACA-BA49429FF6B3}" type="datetimeFigureOut">
               <a:rPr lang="en-US" smtClean="0"/>
               <a:pPr/>
-              <a:t>12/3/2024</a:t>
+              <a:t>12/4/2024</a:t>
             </a:fld>
             <a:endParaRPr lang="en-US"/>
           </a:p>
@@ -5210,6 +5281,118 @@
   <p:cSld>
     <p:spTree>
       <p:nvGrpSpPr>
+        <p:cNvPr id="1" name="">
+          <a:extLst>
+            <a:ext uri="{FF2B5EF4-FFF2-40B4-BE49-F238E27FC236}">
+              <a16:creationId xmlns:a16="http://schemas.microsoft.com/office/drawing/2014/main" id="{84855682-7F40-531B-6167-D1440E753C62}"/>
+            </a:ext>
+          </a:extLst>
+        </p:cNvPr>
+        <p:cNvGrpSpPr/>
+        <p:nvPr/>
+      </p:nvGrpSpPr>
+      <p:grpSpPr>
+        <a:xfrm>
+          <a:off x="0" y="0"/>
+          <a:ext cx="0" cy="0"/>
+          <a:chOff x="0" y="0"/>
+          <a:chExt cx="0" cy="0"/>
+        </a:xfrm>
+      </p:grpSpPr>
+      <p:sp>
+        <p:nvSpPr>
+          <p:cNvPr id="2" name="Slide Image Placeholder 1">
+            <a:extLst>
+              <a:ext uri="{FF2B5EF4-FFF2-40B4-BE49-F238E27FC236}">
+                <a16:creationId xmlns:a16="http://schemas.microsoft.com/office/drawing/2014/main" id="{E657B018-2B73-299B-F17F-F0E4FCA7BFC0}"/>
+              </a:ext>
+            </a:extLst>
+          </p:cNvPr>
+          <p:cNvSpPr>
+            <a:spLocks noGrp="1" noRot="1" noChangeAspect="1"/>
+          </p:cNvSpPr>
+          <p:nvPr>
+            <p:ph type="sldImg"/>
+          </p:nvPr>
+        </p:nvSpPr>
+        <p:spPr/>
+      </p:sp>
+      <p:sp>
+        <p:nvSpPr>
+          <p:cNvPr id="3" name="Notes Placeholder 2">
+            <a:extLst>
+              <a:ext uri="{FF2B5EF4-FFF2-40B4-BE49-F238E27FC236}">
+                <a16:creationId xmlns:a16="http://schemas.microsoft.com/office/drawing/2014/main" id="{88F33547-9828-B21F-FEA8-2CC16BADD9F8}"/>
+              </a:ext>
+            </a:extLst>
+          </p:cNvPr>
+          <p:cNvSpPr>
+            <a:spLocks noGrp="1"/>
+          </p:cNvSpPr>
+          <p:nvPr>
+            <p:ph type="body" idx="1"/>
+          </p:nvPr>
+        </p:nvSpPr>
+        <p:spPr/>
+        <p:txBody>
+          <a:bodyPr/>
+          <a:lstStyle/>
+          <a:p>
+            <a:r>
+              <a:rPr lang="en-US"/>
+              <a:t>Jacob</a:t>
+            </a:r>
+          </a:p>
+        </p:txBody>
+      </p:sp>
+      <p:sp>
+        <p:nvSpPr>
+          <p:cNvPr id="4" name="Slide Number Placeholder 3">
+            <a:extLst>
+              <a:ext uri="{FF2B5EF4-FFF2-40B4-BE49-F238E27FC236}">
+                <a16:creationId xmlns:a16="http://schemas.microsoft.com/office/drawing/2014/main" id="{6C090867-716C-5C42-D027-1F8B38D0B0F2}"/>
+              </a:ext>
+            </a:extLst>
+          </p:cNvPr>
+          <p:cNvSpPr>
+            <a:spLocks noGrp="1"/>
+          </p:cNvSpPr>
+          <p:nvPr>
+            <p:ph type="sldNum" sz="quarter" idx="5"/>
+          </p:nvPr>
+        </p:nvSpPr>
+        <p:spPr/>
+        <p:txBody>
+          <a:bodyPr/>
+          <a:lstStyle/>
+          <a:p>
+            <a:fld id="{60BDDD1B-7981-514B-B211-D97C9422D57B}" type="slidenum">
+              <a:rPr lang="en-US" smtClean="0"/>
+              <a:pPr/>
+              <a:t>12</a:t>
+            </a:fld>
+            <a:endParaRPr lang="en-US"/>
+          </a:p>
+        </p:txBody>
+      </p:sp>
+    </p:spTree>
+    <p:extLst>
+      <p:ext uri="{BB962C8B-B14F-4D97-AF65-F5344CB8AC3E}">
+        <p14:creationId xmlns:p14="http://schemas.microsoft.com/office/powerpoint/2010/main" val="1991645595"/>
+      </p:ext>
+    </p:extLst>
+  </p:cSld>
+  <p:clrMapOvr>
+    <a:masterClrMapping/>
+  </p:clrMapOvr>
+</p:notes>
+</file>
+
+<file path=ppt/notesSlides/notesSlide4.xml><?xml version="1.0" encoding="utf-8"?>
+<p:notes xmlns:a="http://schemas.openxmlformats.org/drawingml/2006/main" xmlns:r="http://schemas.openxmlformats.org/officeDocument/2006/relationships" xmlns:p="http://schemas.openxmlformats.org/presentationml/2006/main">
+  <p:cSld>
+    <p:spTree>
+      <p:nvGrpSpPr>
         <p:cNvPr id="1" name=""/>
         <p:cNvGrpSpPr/>
         <p:nvPr/>
@@ -5274,7 +5457,7 @@
             <a:fld id="{60BDDD1B-7981-514B-B211-D97C9422D57B}" type="slidenum">
               <a:rPr lang="en-US" smtClean="0"/>
               <a:pPr/>
-              <a:t>12</a:t>
+              <a:t>13</a:t>
             </a:fld>
             <a:endParaRPr lang="en-US"/>
           </a:p>
@@ -5588,13 +5771,13 @@
   <p:clrMapOvr>
     <a:masterClrMapping/>
   </p:clrMapOvr>
-  <mc:AlternateContent xmlns:mc="http://schemas.openxmlformats.org/markup-compatibility/2006">
-    <mc:Choice xmlns:p14="http://schemas.microsoft.com/office/powerpoint/2010/main" Requires="p14">
+  <mc:AlternateContent xmlns:mc="http://schemas.openxmlformats.org/markup-compatibility/2006" xmlns:p14="http://schemas.microsoft.com/office/powerpoint/2010/main">
+    <mc:Choice Requires="p14">
       <p:transition spd="med" p14:dur="700">
         <p:fade/>
       </p:transition>
     </mc:Choice>
-    <mc:Fallback>
+    <mc:Fallback xmlns="">
       <p:transition spd="med">
         <p:fade/>
       </p:transition>
@@ -5829,13 +6012,13 @@
   <p:clrMapOvr>
     <a:masterClrMapping/>
   </p:clrMapOvr>
-  <mc:AlternateContent xmlns:mc="http://schemas.openxmlformats.org/markup-compatibility/2006">
-    <mc:Choice xmlns:p14="http://schemas.microsoft.com/office/powerpoint/2010/main" Requires="p14">
+  <mc:AlternateContent xmlns:mc="http://schemas.openxmlformats.org/markup-compatibility/2006" xmlns:p14="http://schemas.microsoft.com/office/powerpoint/2010/main">
+    <mc:Choice Requires="p14">
       <p:transition spd="med" p14:dur="700">
         <p:fade/>
       </p:transition>
     </mc:Choice>
-    <mc:Fallback>
+    <mc:Fallback xmlns="">
       <p:transition spd="med">
         <p:fade/>
       </p:transition>
@@ -6028,13 +6211,13 @@
   <p:clrMapOvr>
     <a:masterClrMapping/>
   </p:clrMapOvr>
-  <mc:AlternateContent xmlns:mc="http://schemas.openxmlformats.org/markup-compatibility/2006">
-    <mc:Choice xmlns:p14="http://schemas.microsoft.com/office/powerpoint/2010/main" Requires="p14">
+  <mc:AlternateContent xmlns:mc="http://schemas.openxmlformats.org/markup-compatibility/2006" xmlns:p14="http://schemas.microsoft.com/office/powerpoint/2010/main">
+    <mc:Choice Requires="p14">
       <p:transition spd="med" p14:dur="700">
         <p:fade/>
       </p:transition>
     </mc:Choice>
-    <mc:Fallback>
+    <mc:Fallback xmlns="">
       <p:transition spd="med">
         <p:fade/>
       </p:transition>
@@ -6324,13 +6507,13 @@
   <p:clrMapOvr>
     <a:masterClrMapping/>
   </p:clrMapOvr>
-  <mc:AlternateContent xmlns:mc="http://schemas.openxmlformats.org/markup-compatibility/2006">
-    <mc:Choice xmlns:p14="http://schemas.microsoft.com/office/powerpoint/2010/main" Requires="p14">
+  <mc:AlternateContent xmlns:mc="http://schemas.openxmlformats.org/markup-compatibility/2006" xmlns:p14="http://schemas.microsoft.com/office/powerpoint/2010/main">
+    <mc:Choice Requires="p14">
       <p:transition spd="med" p14:dur="700">
         <p:fade/>
       </p:transition>
     </mc:Choice>
-    <mc:Fallback>
+    <mc:Fallback xmlns="">
       <p:transition spd="med">
         <p:fade/>
       </p:transition>
@@ -6619,13 +6802,13 @@
   <p:clrMapOvr>
     <a:masterClrMapping/>
   </p:clrMapOvr>
-  <mc:AlternateContent xmlns:mc="http://schemas.openxmlformats.org/markup-compatibility/2006">
-    <mc:Choice xmlns:p14="http://schemas.microsoft.com/office/powerpoint/2010/main" Requires="p14">
+  <mc:AlternateContent xmlns:mc="http://schemas.openxmlformats.org/markup-compatibility/2006" xmlns:p14="http://schemas.microsoft.com/office/powerpoint/2010/main">
+    <mc:Choice Requires="p14">
       <p:transition spd="med" p14:dur="700">
         <p:fade/>
       </p:transition>
     </mc:Choice>
-    <mc:Fallback>
+    <mc:Fallback xmlns="">
       <p:transition spd="med">
         <p:fade/>
       </p:transition>
@@ -7135,13 +7318,13 @@
   <p:clrMapOvr>
     <a:masterClrMapping/>
   </p:clrMapOvr>
-  <mc:AlternateContent xmlns:mc="http://schemas.openxmlformats.org/markup-compatibility/2006">
-    <mc:Choice xmlns:p14="http://schemas.microsoft.com/office/powerpoint/2010/main" Requires="p14">
+  <mc:AlternateContent xmlns:mc="http://schemas.openxmlformats.org/markup-compatibility/2006" xmlns:p14="http://schemas.microsoft.com/office/powerpoint/2010/main">
+    <mc:Choice Requires="p14">
       <p:transition spd="med" p14:dur="700">
         <p:fade/>
       </p:transition>
     </mc:Choice>
-    <mc:Fallback>
+    <mc:Fallback xmlns="">
       <p:transition spd="med">
         <p:fade/>
       </p:transition>
@@ -7804,13 +7987,13 @@
   <p:clrMapOvr>
     <a:masterClrMapping/>
   </p:clrMapOvr>
-  <mc:AlternateContent xmlns:mc="http://schemas.openxmlformats.org/markup-compatibility/2006">
-    <mc:Choice xmlns:p14="http://schemas.microsoft.com/office/powerpoint/2010/main" Requires="p14">
+  <mc:AlternateContent xmlns:mc="http://schemas.openxmlformats.org/markup-compatibility/2006" xmlns:p14="http://schemas.microsoft.com/office/powerpoint/2010/main">
+    <mc:Choice Requires="p14">
       <p:transition spd="med" p14:dur="700">
         <p:fade/>
       </p:transition>
     </mc:Choice>
-    <mc:Fallback>
+    <mc:Fallback xmlns="">
       <p:transition spd="med">
         <p:fade/>
       </p:transition>
@@ -8151,13 +8334,13 @@
   <p:clrMapOvr>
     <a:masterClrMapping/>
   </p:clrMapOvr>
-  <mc:AlternateContent xmlns:mc="http://schemas.openxmlformats.org/markup-compatibility/2006">
-    <mc:Choice xmlns:p14="http://schemas.microsoft.com/office/powerpoint/2010/main" Requires="p14">
+  <mc:AlternateContent xmlns:mc="http://schemas.openxmlformats.org/markup-compatibility/2006" xmlns:p14="http://schemas.microsoft.com/office/powerpoint/2010/main">
+    <mc:Choice Requires="p14">
       <p:transition spd="med" p14:dur="700">
         <p:fade/>
       </p:transition>
     </mc:Choice>
-    <mc:Fallback>
+    <mc:Fallback xmlns="">
       <p:transition spd="med">
         <p:fade/>
       </p:transition>
@@ -8431,13 +8614,13 @@
   <p:clrMapOvr>
     <a:masterClrMapping/>
   </p:clrMapOvr>
-  <mc:AlternateContent xmlns:mc="http://schemas.openxmlformats.org/markup-compatibility/2006">
-    <mc:Choice xmlns:p14="http://schemas.microsoft.com/office/powerpoint/2010/main" Requires="p14">
+  <mc:AlternateContent xmlns:mc="http://schemas.openxmlformats.org/markup-compatibility/2006" xmlns:p14="http://schemas.microsoft.com/office/powerpoint/2010/main">
+    <mc:Choice Requires="p14">
       <p:transition spd="med" p14:dur="700">
         <p:fade/>
       </p:transition>
     </mc:Choice>
-    <mc:Fallback>
+    <mc:Fallback xmlns="">
       <p:transition spd="med">
         <p:fade/>
       </p:transition>
@@ -8748,13 +8931,13 @@
   <p:clrMapOvr>
     <a:masterClrMapping/>
   </p:clrMapOvr>
-  <mc:AlternateContent xmlns:mc="http://schemas.openxmlformats.org/markup-compatibility/2006">
-    <mc:Choice xmlns:p14="http://schemas.microsoft.com/office/powerpoint/2010/main" Requires="p14">
+  <mc:AlternateContent xmlns:mc="http://schemas.openxmlformats.org/markup-compatibility/2006" xmlns:p14="http://schemas.microsoft.com/office/powerpoint/2010/main">
+    <mc:Choice Requires="p14">
       <p:transition spd="med" p14:dur="700">
         <p:fade/>
       </p:transition>
     </mc:Choice>
-    <mc:Fallback>
+    <mc:Fallback xmlns="">
       <p:transition spd="med">
         <p:fade/>
       </p:transition>
@@ -8805,13 +8988,13 @@
     <p:sldLayoutId id="2147483663" r:id="rId9"/>
     <p:sldLayoutId id="2147483655" r:id="rId10"/>
   </p:sldLayoutIdLst>
-  <mc:AlternateContent xmlns:mc="http://schemas.openxmlformats.org/markup-compatibility/2006">
-    <mc:Choice xmlns:p14="http://schemas.microsoft.com/office/powerpoint/2010/main" Requires="p14">
+  <mc:AlternateContent xmlns:mc="http://schemas.openxmlformats.org/markup-compatibility/2006" xmlns:p14="http://schemas.microsoft.com/office/powerpoint/2010/main">
+    <mc:Choice Requires="p14">
       <p:transition spd="med" p14:dur="700">
         <p:fade/>
       </p:transition>
     </mc:Choice>
-    <mc:Fallback>
+    <mc:Fallback xmlns="">
       <p:transition spd="med">
         <p:fade/>
       </p:transition>
@@ -9191,13 +9374,13 @@
   <p:clrMapOvr>
     <a:masterClrMapping/>
   </p:clrMapOvr>
-  <mc:AlternateContent xmlns:mc="http://schemas.openxmlformats.org/markup-compatibility/2006">
-    <mc:Choice xmlns:p14="http://schemas.microsoft.com/office/powerpoint/2010/main" Requires="p14">
+  <mc:AlternateContent xmlns:mc="http://schemas.openxmlformats.org/markup-compatibility/2006" xmlns:p14="http://schemas.microsoft.com/office/powerpoint/2010/main">
+    <mc:Choice Requires="p14">
       <p:transition spd="med" p14:dur="700">
         <p:fade/>
       </p:transition>
     </mc:Choice>
-    <mc:Fallback>
+    <mc:Fallback xmlns="">
       <p:transition spd="med">
         <p:fade/>
       </p:transition>
@@ -12427,13 +12610,13 @@
   <p:clrMapOvr>
     <a:masterClrMapping/>
   </p:clrMapOvr>
-  <mc:AlternateContent xmlns:mc="http://schemas.openxmlformats.org/markup-compatibility/2006">
-    <mc:Choice xmlns:p14="http://schemas.microsoft.com/office/powerpoint/2010/main" Requires="p14">
+  <mc:AlternateContent xmlns:mc="http://schemas.openxmlformats.org/markup-compatibility/2006" xmlns:p14="http://schemas.microsoft.com/office/powerpoint/2010/main">
+    <mc:Choice Requires="p14">
       <p:transition spd="med" p14:dur="700">
         <p:fade/>
       </p:transition>
     </mc:Choice>
-    <mc:Fallback>
+    <mc:Fallback xmlns="">
       <p:transition spd="med">
         <p:fade/>
       </p:transition>
@@ -12486,20 +12669,20 @@
           <a:lstStyle/>
           <a:p>
             <a:r>
-              <a:rPr lang="en-US">
+              <a:rPr lang="en-US" dirty="0">
                 <a:latin typeface="Century Gothic"/>
               </a:rPr>
               <a:t>Our breast cancer dataset was small (only 698 samples) especially for HER2 and Normal-like breast cancer (N=42 and N=30 respectively)</a:t>
             </a:r>
           </a:p>
           <a:p>
-            <a:endParaRPr lang="en-US">
+            <a:endParaRPr lang="en-US" dirty="0">
               <a:latin typeface="Century Gothic"/>
             </a:endParaRPr>
           </a:p>
           <a:p>
             <a:r>
-              <a:rPr lang="en-US">
+              <a:rPr lang="en-US" dirty="0">
                 <a:latin typeface="Century Gothic"/>
               </a:rPr>
               <a:t>Due to the high dimensionality of our dataset, we were not able to run SHAP on our entire pipelines and had to resort to interpretability based on reduced components such as PCA and LLE</a:t>
@@ -12508,7 +12691,7 @@
           <a:p>
             <a:pPr lvl="1"/>
             <a:r>
-              <a:rPr lang="en-US">
+              <a:rPr lang="en-US" dirty="0">
                 <a:latin typeface="Century Gothic"/>
               </a:rPr>
               <a:t>Attempted to solve by:</a:t>
@@ -12517,7 +12700,7 @@
           <a:p>
             <a:pPr lvl="2"/>
             <a:r>
-              <a:rPr lang="en-US">
+              <a:rPr lang="en-US" dirty="0">
                 <a:latin typeface="Century Gothic"/>
               </a:rPr>
               <a:t>Removing imputing from pipeline</a:t>
@@ -12526,7 +12709,7 @@
           <a:p>
             <a:pPr lvl="2"/>
             <a:r>
-              <a:rPr lang="en-US">
+              <a:rPr lang="en-US" dirty="0">
                 <a:latin typeface="Century Gothic"/>
               </a:rPr>
               <a:t>Removing dimensionality reduction from pipeline</a:t>
@@ -12535,7 +12718,7 @@
           <a:p>
             <a:pPr lvl="2"/>
             <a:r>
-              <a:rPr lang="en-US">
+              <a:rPr lang="en-US" dirty="0">
                 <a:latin typeface="Century Gothic"/>
               </a:rPr>
               <a:t>Reducing the number of features to HM27 CpGs</a:t>
@@ -12543,13 +12726,13 @@
           </a:p>
           <a:p>
             <a:pPr lvl="2"/>
-            <a:endParaRPr lang="en-US"/>
+            <a:endParaRPr lang="en-US" dirty="0"/>
           </a:p>
           <a:p>
             <a:pPr marL="640080" lvl="2" indent="0">
               <a:buNone/>
             </a:pPr>
-            <a:endParaRPr lang="en-US"/>
+            <a:endParaRPr lang="en-US" dirty="0"/>
           </a:p>
         </p:txBody>
       </p:sp>
@@ -12591,6 +12774,2371 @@
   <p:clrMapOvr>
     <a:masterClrMapping/>
   </p:clrMapOvr>
+  <mc:AlternateContent xmlns:mc="http://schemas.openxmlformats.org/markup-compatibility/2006" xmlns:p14="http://schemas.microsoft.com/office/powerpoint/2010/main">
+    <mc:Choice Requires="p14">
+      <p:transition spd="med" p14:dur="700">
+        <p:fade/>
+      </p:transition>
+    </mc:Choice>
+    <mc:Fallback xmlns="">
+      <p:transition spd="med">
+        <p:fade/>
+      </p:transition>
+    </mc:Fallback>
+  </mc:AlternateContent>
+</p:sld>
+</file>
+
+<file path=ppt/slides/slide12.xml><?xml version="1.0" encoding="utf-8"?>
+<p:sld xmlns:a="http://schemas.openxmlformats.org/drawingml/2006/main" xmlns:r="http://schemas.openxmlformats.org/officeDocument/2006/relationships" xmlns:p="http://schemas.openxmlformats.org/presentationml/2006/main">
+  <p:cSld>
+    <p:spTree>
+      <p:nvGrpSpPr>
+        <p:cNvPr id="1" name="">
+          <a:extLst>
+            <a:ext uri="{FF2B5EF4-FFF2-40B4-BE49-F238E27FC236}">
+              <a16:creationId xmlns:a16="http://schemas.microsoft.com/office/drawing/2014/main" id="{37EE35CB-626B-69F7-173E-8745F3B5CF24}"/>
+            </a:ext>
+          </a:extLst>
+        </p:cNvPr>
+        <p:cNvGrpSpPr/>
+        <p:nvPr/>
+      </p:nvGrpSpPr>
+      <p:grpSpPr>
+        <a:xfrm>
+          <a:off x="0" y="0"/>
+          <a:ext cx="0" cy="0"/>
+          <a:chOff x="0" y="0"/>
+          <a:chExt cx="0" cy="0"/>
+        </a:xfrm>
+      </p:grpSpPr>
+      <p:pic>
+        <p:nvPicPr>
+          <p:cNvPr id="7" name="Picture 6">
+            <a:extLst>
+              <a:ext uri="{FF2B5EF4-FFF2-40B4-BE49-F238E27FC236}">
+                <a16:creationId xmlns:a16="http://schemas.microsoft.com/office/drawing/2014/main" id="{5060E8B2-7E91-DAB6-2F97-92A467F0FC2D}"/>
+              </a:ext>
+            </a:extLst>
+          </p:cNvPr>
+          <p:cNvPicPr>
+            <a:picLocks noChangeAspect="1"/>
+          </p:cNvPicPr>
+          <p:nvPr/>
+        </p:nvPicPr>
+        <p:blipFill>
+          <a:blip r:embed="rId3"/>
+          <a:srcRect/>
+          <a:stretch/>
+        </p:blipFill>
+        <p:spPr>
+          <a:xfrm>
+            <a:off x="6888840" y="1643033"/>
+            <a:ext cx="7511145" cy="2471767"/>
+          </a:xfrm>
+          <a:prstGeom prst="rect">
+            <a:avLst/>
+          </a:prstGeom>
+          <a:noFill/>
+        </p:spPr>
+      </p:pic>
+      <p:sp>
+        <p:nvSpPr>
+          <p:cNvPr id="3" name="Title 2">
+            <a:extLst>
+              <a:ext uri="{FF2B5EF4-FFF2-40B4-BE49-F238E27FC236}">
+                <a16:creationId xmlns:a16="http://schemas.microsoft.com/office/drawing/2014/main" id="{00F0EABC-ED7A-CBD6-EB6F-8F3D06850CB0}"/>
+              </a:ext>
+            </a:extLst>
+          </p:cNvPr>
+          <p:cNvSpPr>
+            <a:spLocks noGrp="1"/>
+          </p:cNvSpPr>
+          <p:nvPr>
+            <p:ph type="title"/>
+          </p:nvPr>
+        </p:nvSpPr>
+        <p:spPr>
+          <a:xfrm>
+            <a:off x="1104900" y="694482"/>
+            <a:ext cx="12793980" cy="659444"/>
+          </a:xfrm>
+        </p:spPr>
+        <p:txBody>
+          <a:bodyPr>
+            <a:normAutofit fontScale="90000"/>
+          </a:bodyPr>
+          <a:lstStyle/>
+          <a:p>
+            <a:pPr>
+              <a:lnSpc>
+                <a:spcPct val="90000"/>
+              </a:lnSpc>
+            </a:pPr>
+            <a:r>
+              <a:rPr lang="en-US" sz="4100" dirty="0"/>
+              <a:t>No Ideationally Reduction Alternate Solution</a:t>
+            </a:r>
+          </a:p>
+        </p:txBody>
+      </p:sp>
+      <p:graphicFrame>
+        <p:nvGraphicFramePr>
+          <p:cNvPr id="10" name="Table 9">
+            <a:extLst>
+              <a:ext uri="{FF2B5EF4-FFF2-40B4-BE49-F238E27FC236}">
+                <a16:creationId xmlns:a16="http://schemas.microsoft.com/office/drawing/2014/main" id="{76F478D0-93BF-5650-3E1C-6149E8CB1D63}"/>
+              </a:ext>
+            </a:extLst>
+          </p:cNvPr>
+          <p:cNvGraphicFramePr>
+            <a:graphicFrameLocks noGrp="1"/>
+          </p:cNvGraphicFramePr>
+          <p:nvPr>
+            <p:extLst>
+              <p:ext uri="{D42A27DB-BD31-4B8C-83A1-F6EECF244321}">
+                <p14:modId xmlns:p14="http://schemas.microsoft.com/office/powerpoint/2010/main" val="2998902334"/>
+              </p:ext>
+            </p:extLst>
+          </p:nvPr>
+        </p:nvGraphicFramePr>
+        <p:xfrm>
+          <a:off x="11068932" y="4586635"/>
+          <a:ext cx="3378200" cy="1266825"/>
+        </p:xfrm>
+        <a:graphic>
+          <a:graphicData uri="http://schemas.openxmlformats.org/drawingml/2006/table">
+            <a:tbl>
+              <a:tblPr bandRow="1">
+                <a:tableStyleId>{5C22544A-7EE6-4342-B048-85BDC9FD1C3A}</a:tableStyleId>
+              </a:tblPr>
+              <a:tblGrid>
+                <a:gridCol w="787400">
+                  <a:extLst>
+                    <a:ext uri="{9D8B030D-6E8A-4147-A177-3AD203B41FA5}">
+                      <a16:colId xmlns:a16="http://schemas.microsoft.com/office/drawing/2014/main" val="252568742"/>
+                    </a:ext>
+                  </a:extLst>
+                </a:gridCol>
+                <a:gridCol w="647700">
+                  <a:extLst>
+                    <a:ext uri="{9D8B030D-6E8A-4147-A177-3AD203B41FA5}">
+                      <a16:colId xmlns:a16="http://schemas.microsoft.com/office/drawing/2014/main" val="3950990828"/>
+                    </a:ext>
+                  </a:extLst>
+                </a:gridCol>
+                <a:gridCol w="647700">
+                  <a:extLst>
+                    <a:ext uri="{9D8B030D-6E8A-4147-A177-3AD203B41FA5}">
+                      <a16:colId xmlns:a16="http://schemas.microsoft.com/office/drawing/2014/main" val="1988525965"/>
+                    </a:ext>
+                  </a:extLst>
+                </a:gridCol>
+                <a:gridCol w="647700">
+                  <a:extLst>
+                    <a:ext uri="{9D8B030D-6E8A-4147-A177-3AD203B41FA5}">
+                      <a16:colId xmlns:a16="http://schemas.microsoft.com/office/drawing/2014/main" val="908335857"/>
+                    </a:ext>
+                  </a:extLst>
+                </a:gridCol>
+                <a:gridCol w="647700">
+                  <a:extLst>
+                    <a:ext uri="{9D8B030D-6E8A-4147-A177-3AD203B41FA5}">
+                      <a16:colId xmlns:a16="http://schemas.microsoft.com/office/drawing/2014/main" val="1442929899"/>
+                    </a:ext>
+                  </a:extLst>
+                </a:gridCol>
+              </a:tblGrid>
+              <a:tr h="180975">
+                <a:tc>
+                  <a:txBody>
+                    <a:bodyPr/>
+                    <a:lstStyle/>
+                    <a:p>
+                      <a:pPr algn="ctr" fontAlgn="b"/>
+                      <a:r>
+                        <a:rPr lang="en-US" sz="1100" b="0" i="0" u="none" strike="noStrike">
+                          <a:solidFill>
+                            <a:srgbClr val="000000"/>
+                          </a:solidFill>
+                          <a:effectLst/>
+                          <a:latin typeface="Aptos Narrow" panose="020B0004020202020204" pitchFamily="34" charset="0"/>
+                        </a:rPr>
+                        <a:t> </a:t>
+                      </a:r>
+                    </a:p>
+                  </a:txBody>
+                  <a:tcPr marL="9525" marR="9525" marT="9525" marB="0" anchor="b">
+                    <a:lnL w="6350" cap="flat" cmpd="sng" algn="ctr">
+                      <a:solidFill>
+                        <a:srgbClr val="000000"/>
+                      </a:solidFill>
+                      <a:prstDash val="solid"/>
+                      <a:round/>
+                      <a:headEnd type="none" w="med" len="med"/>
+                      <a:tailEnd type="none" w="med" len="med"/>
+                    </a:lnL>
+                    <a:lnR w="6350" cap="flat" cmpd="sng" algn="ctr">
+                      <a:solidFill>
+                        <a:srgbClr val="000000"/>
+                      </a:solidFill>
+                      <a:prstDash val="solid"/>
+                      <a:round/>
+                      <a:headEnd type="none" w="med" len="med"/>
+                      <a:tailEnd type="none" w="med" len="med"/>
+                    </a:lnR>
+                    <a:lnT w="6350" cap="flat" cmpd="sng" algn="ctr">
+                      <a:solidFill>
+                        <a:srgbClr val="000000"/>
+                      </a:solidFill>
+                      <a:prstDash val="solid"/>
+                      <a:round/>
+                      <a:headEnd type="none" w="med" len="med"/>
+                      <a:tailEnd type="none" w="med" len="med"/>
+                    </a:lnT>
+                    <a:lnB w="6350" cap="flat" cmpd="sng" algn="ctr">
+                      <a:solidFill>
+                        <a:srgbClr val="000000"/>
+                      </a:solidFill>
+                      <a:prstDash val="solid"/>
+                      <a:round/>
+                      <a:headEnd type="none" w="med" len="med"/>
+                      <a:tailEnd type="none" w="med" len="med"/>
+                    </a:lnB>
+                    <a:noFill/>
+                  </a:tcPr>
+                </a:tc>
+                <a:tc>
+                  <a:txBody>
+                    <a:bodyPr/>
+                    <a:lstStyle/>
+                    <a:p>
+                      <a:pPr algn="ctr" fontAlgn="b"/>
+                      <a:r>
+                        <a:rPr lang="en-US" sz="1100" b="1" i="0" u="none" strike="noStrike">
+                          <a:solidFill>
+                            <a:srgbClr val="000000"/>
+                          </a:solidFill>
+                          <a:effectLst/>
+                          <a:latin typeface="Aptos Narrow" panose="020B0004020202020204" pitchFamily="34" charset="0"/>
+                        </a:rPr>
+                        <a:t>precision</a:t>
+                      </a:r>
+                    </a:p>
+                  </a:txBody>
+                  <a:tcPr marL="9525" marR="9525" marT="9525" marB="0" anchor="b">
+                    <a:lnL w="6350" cap="flat" cmpd="sng" algn="ctr">
+                      <a:solidFill>
+                        <a:srgbClr val="000000"/>
+                      </a:solidFill>
+                      <a:prstDash val="solid"/>
+                      <a:round/>
+                      <a:headEnd type="none" w="med" len="med"/>
+                      <a:tailEnd type="none" w="med" len="med"/>
+                    </a:lnL>
+                    <a:lnR w="6350" cap="flat" cmpd="sng" algn="ctr">
+                      <a:solidFill>
+                        <a:srgbClr val="000000"/>
+                      </a:solidFill>
+                      <a:prstDash val="solid"/>
+                      <a:round/>
+                      <a:headEnd type="none" w="med" len="med"/>
+                      <a:tailEnd type="none" w="med" len="med"/>
+                    </a:lnR>
+                    <a:lnT w="6350" cap="flat" cmpd="sng" algn="ctr">
+                      <a:solidFill>
+                        <a:srgbClr val="000000"/>
+                      </a:solidFill>
+                      <a:prstDash val="solid"/>
+                      <a:round/>
+                      <a:headEnd type="none" w="med" len="med"/>
+                      <a:tailEnd type="none" w="med" len="med"/>
+                    </a:lnT>
+                    <a:lnB w="6350" cap="flat" cmpd="sng" algn="ctr">
+                      <a:solidFill>
+                        <a:srgbClr val="000000"/>
+                      </a:solidFill>
+                      <a:prstDash val="solid"/>
+                      <a:round/>
+                      <a:headEnd type="none" w="med" len="med"/>
+                      <a:tailEnd type="none" w="med" len="med"/>
+                    </a:lnB>
+                    <a:noFill/>
+                  </a:tcPr>
+                </a:tc>
+                <a:tc>
+                  <a:txBody>
+                    <a:bodyPr/>
+                    <a:lstStyle/>
+                    <a:p>
+                      <a:pPr algn="ctr" fontAlgn="b"/>
+                      <a:r>
+                        <a:rPr lang="en-US" sz="1100" b="1" i="0" u="none" strike="noStrike">
+                          <a:solidFill>
+                            <a:srgbClr val="000000"/>
+                          </a:solidFill>
+                          <a:effectLst/>
+                          <a:latin typeface="Aptos Narrow" panose="020B0004020202020204" pitchFamily="34" charset="0"/>
+                        </a:rPr>
+                        <a:t>recall</a:t>
+                      </a:r>
+                    </a:p>
+                  </a:txBody>
+                  <a:tcPr marL="9525" marR="9525" marT="9525" marB="0" anchor="b">
+                    <a:lnL w="6350" cap="flat" cmpd="sng" algn="ctr">
+                      <a:solidFill>
+                        <a:srgbClr val="000000"/>
+                      </a:solidFill>
+                      <a:prstDash val="solid"/>
+                      <a:round/>
+                      <a:headEnd type="none" w="med" len="med"/>
+                      <a:tailEnd type="none" w="med" len="med"/>
+                    </a:lnL>
+                    <a:lnR w="6350" cap="flat" cmpd="sng" algn="ctr">
+                      <a:solidFill>
+                        <a:srgbClr val="000000"/>
+                      </a:solidFill>
+                      <a:prstDash val="solid"/>
+                      <a:round/>
+                      <a:headEnd type="none" w="med" len="med"/>
+                      <a:tailEnd type="none" w="med" len="med"/>
+                    </a:lnR>
+                    <a:lnT w="6350" cap="flat" cmpd="sng" algn="ctr">
+                      <a:solidFill>
+                        <a:srgbClr val="000000"/>
+                      </a:solidFill>
+                      <a:prstDash val="solid"/>
+                      <a:round/>
+                      <a:headEnd type="none" w="med" len="med"/>
+                      <a:tailEnd type="none" w="med" len="med"/>
+                    </a:lnT>
+                    <a:lnB w="6350" cap="flat" cmpd="sng" algn="ctr">
+                      <a:solidFill>
+                        <a:srgbClr val="000000"/>
+                      </a:solidFill>
+                      <a:prstDash val="solid"/>
+                      <a:round/>
+                      <a:headEnd type="none" w="med" len="med"/>
+                      <a:tailEnd type="none" w="med" len="med"/>
+                    </a:lnB>
+                    <a:noFill/>
+                  </a:tcPr>
+                </a:tc>
+                <a:tc>
+                  <a:txBody>
+                    <a:bodyPr/>
+                    <a:lstStyle/>
+                    <a:p>
+                      <a:pPr algn="ctr" fontAlgn="b"/>
+                      <a:r>
+                        <a:rPr lang="en-US" sz="1100" b="1" i="0" u="none" strike="noStrike">
+                          <a:solidFill>
+                            <a:srgbClr val="000000"/>
+                          </a:solidFill>
+                          <a:effectLst/>
+                          <a:latin typeface="Aptos Narrow" panose="020B0004020202020204" pitchFamily="34" charset="0"/>
+                        </a:rPr>
+                        <a:t>f1-score</a:t>
+                      </a:r>
+                    </a:p>
+                  </a:txBody>
+                  <a:tcPr marL="9525" marR="9525" marT="9525" marB="0" anchor="b">
+                    <a:lnL w="6350" cap="flat" cmpd="sng" algn="ctr">
+                      <a:solidFill>
+                        <a:srgbClr val="000000"/>
+                      </a:solidFill>
+                      <a:prstDash val="solid"/>
+                      <a:round/>
+                      <a:headEnd type="none" w="med" len="med"/>
+                      <a:tailEnd type="none" w="med" len="med"/>
+                    </a:lnL>
+                    <a:lnR w="6350" cap="flat" cmpd="sng" algn="ctr">
+                      <a:solidFill>
+                        <a:srgbClr val="000000"/>
+                      </a:solidFill>
+                      <a:prstDash val="solid"/>
+                      <a:round/>
+                      <a:headEnd type="none" w="med" len="med"/>
+                      <a:tailEnd type="none" w="med" len="med"/>
+                    </a:lnR>
+                    <a:lnT w="6350" cap="flat" cmpd="sng" algn="ctr">
+                      <a:solidFill>
+                        <a:srgbClr val="000000"/>
+                      </a:solidFill>
+                      <a:prstDash val="solid"/>
+                      <a:round/>
+                      <a:headEnd type="none" w="med" len="med"/>
+                      <a:tailEnd type="none" w="med" len="med"/>
+                    </a:lnT>
+                    <a:lnB w="6350" cap="flat" cmpd="sng" algn="ctr">
+                      <a:solidFill>
+                        <a:srgbClr val="000000"/>
+                      </a:solidFill>
+                      <a:prstDash val="solid"/>
+                      <a:round/>
+                      <a:headEnd type="none" w="med" len="med"/>
+                      <a:tailEnd type="none" w="med" len="med"/>
+                    </a:lnB>
+                    <a:noFill/>
+                  </a:tcPr>
+                </a:tc>
+                <a:tc>
+                  <a:txBody>
+                    <a:bodyPr/>
+                    <a:lstStyle/>
+                    <a:p>
+                      <a:pPr algn="ctr" fontAlgn="b"/>
+                      <a:r>
+                        <a:rPr lang="en-US" sz="1100" b="1" i="0" u="none" strike="noStrike">
+                          <a:solidFill>
+                            <a:srgbClr val="000000"/>
+                          </a:solidFill>
+                          <a:effectLst/>
+                          <a:latin typeface="Aptos Narrow" panose="020B0004020202020204" pitchFamily="34" charset="0"/>
+                        </a:rPr>
+                        <a:t>support</a:t>
+                      </a:r>
+                    </a:p>
+                  </a:txBody>
+                  <a:tcPr marL="9525" marR="9525" marT="9525" marB="0" anchor="b">
+                    <a:lnL w="6350" cap="flat" cmpd="sng" algn="ctr">
+                      <a:solidFill>
+                        <a:srgbClr val="000000"/>
+                      </a:solidFill>
+                      <a:prstDash val="solid"/>
+                      <a:round/>
+                      <a:headEnd type="none" w="med" len="med"/>
+                      <a:tailEnd type="none" w="med" len="med"/>
+                    </a:lnL>
+                    <a:lnR w="6350" cap="flat" cmpd="sng" algn="ctr">
+                      <a:solidFill>
+                        <a:srgbClr val="000000"/>
+                      </a:solidFill>
+                      <a:prstDash val="solid"/>
+                      <a:round/>
+                      <a:headEnd type="none" w="med" len="med"/>
+                      <a:tailEnd type="none" w="med" len="med"/>
+                    </a:lnR>
+                    <a:lnT w="6350" cap="flat" cmpd="sng" algn="ctr">
+                      <a:solidFill>
+                        <a:srgbClr val="000000"/>
+                      </a:solidFill>
+                      <a:prstDash val="solid"/>
+                      <a:round/>
+                      <a:headEnd type="none" w="med" len="med"/>
+                      <a:tailEnd type="none" w="med" len="med"/>
+                    </a:lnT>
+                    <a:lnB w="6350" cap="flat" cmpd="sng" algn="ctr">
+                      <a:solidFill>
+                        <a:srgbClr val="000000"/>
+                      </a:solidFill>
+                      <a:prstDash val="solid"/>
+                      <a:round/>
+                      <a:headEnd type="none" w="med" len="med"/>
+                      <a:tailEnd type="none" w="med" len="med"/>
+                    </a:lnB>
+                    <a:noFill/>
+                  </a:tcPr>
+                </a:tc>
+                <a:extLst>
+                  <a:ext uri="{0D108BD9-81ED-4DB2-BD59-A6C34878D82A}">
+                    <a16:rowId xmlns:a16="http://schemas.microsoft.com/office/drawing/2014/main" val="4142263557"/>
+                  </a:ext>
+                </a:extLst>
+              </a:tr>
+              <a:tr h="180975">
+                <a:tc>
+                  <a:txBody>
+                    <a:bodyPr/>
+                    <a:lstStyle/>
+                    <a:p>
+                      <a:pPr algn="ctr" fontAlgn="b"/>
+                      <a:r>
+                        <a:rPr lang="en-US" sz="1100" b="1" i="0" u="none" strike="noStrike">
+                          <a:solidFill>
+                            <a:srgbClr val="000000"/>
+                          </a:solidFill>
+                          <a:effectLst/>
+                          <a:latin typeface="Aptos Narrow" panose="020B0004020202020204" pitchFamily="34" charset="0"/>
+                        </a:rPr>
+                        <a:t>Normal</a:t>
+                      </a:r>
+                    </a:p>
+                  </a:txBody>
+                  <a:tcPr marL="9525" marR="9525" marT="9525" marB="0" anchor="b">
+                    <a:lnL w="6350" cap="flat" cmpd="sng" algn="ctr">
+                      <a:solidFill>
+                        <a:srgbClr val="000000"/>
+                      </a:solidFill>
+                      <a:prstDash val="solid"/>
+                      <a:round/>
+                      <a:headEnd type="none" w="med" len="med"/>
+                      <a:tailEnd type="none" w="med" len="med"/>
+                    </a:lnL>
+                    <a:lnR w="6350" cap="flat" cmpd="sng" algn="ctr">
+                      <a:solidFill>
+                        <a:srgbClr val="000000"/>
+                      </a:solidFill>
+                      <a:prstDash val="solid"/>
+                      <a:round/>
+                      <a:headEnd type="none" w="med" len="med"/>
+                      <a:tailEnd type="none" w="med" len="med"/>
+                    </a:lnR>
+                    <a:lnT w="6350" cap="flat" cmpd="sng" algn="ctr">
+                      <a:solidFill>
+                        <a:srgbClr val="000000"/>
+                      </a:solidFill>
+                      <a:prstDash val="solid"/>
+                      <a:round/>
+                      <a:headEnd type="none" w="med" len="med"/>
+                      <a:tailEnd type="none" w="med" len="med"/>
+                    </a:lnT>
+                    <a:lnB w="6350" cap="flat" cmpd="sng" algn="ctr">
+                      <a:solidFill>
+                        <a:srgbClr val="000000"/>
+                      </a:solidFill>
+                      <a:prstDash val="solid"/>
+                      <a:round/>
+                      <a:headEnd type="none" w="med" len="med"/>
+                      <a:tailEnd type="none" w="med" len="med"/>
+                    </a:lnB>
+                    <a:noFill/>
+                  </a:tcPr>
+                </a:tc>
+                <a:tc>
+                  <a:txBody>
+                    <a:bodyPr/>
+                    <a:lstStyle/>
+                    <a:p>
+                      <a:pPr algn="ctr" fontAlgn="b"/>
+                      <a:r>
+                        <a:rPr lang="en-US" sz="1100" b="0" i="0" u="none" strike="noStrike" dirty="0">
+                          <a:solidFill>
+                            <a:srgbClr val="000000"/>
+                          </a:solidFill>
+                          <a:effectLst/>
+                          <a:latin typeface="Aptos Narrow" panose="020B0004020202020204" pitchFamily="34" charset="0"/>
+                        </a:rPr>
+                        <a:t>0..88</a:t>
+                      </a:r>
+                    </a:p>
+                  </a:txBody>
+                  <a:tcPr marL="9525" marR="9525" marT="9525" marB="0" anchor="b">
+                    <a:lnL w="6350" cap="flat" cmpd="sng" algn="ctr">
+                      <a:solidFill>
+                        <a:srgbClr val="000000"/>
+                      </a:solidFill>
+                      <a:prstDash val="solid"/>
+                      <a:round/>
+                      <a:headEnd type="none" w="med" len="med"/>
+                      <a:tailEnd type="none" w="med" len="med"/>
+                    </a:lnL>
+                    <a:lnR w="6350" cap="flat" cmpd="sng" algn="ctr">
+                      <a:solidFill>
+                        <a:srgbClr val="000000"/>
+                      </a:solidFill>
+                      <a:prstDash val="solid"/>
+                      <a:round/>
+                      <a:headEnd type="none" w="med" len="med"/>
+                      <a:tailEnd type="none" w="med" len="med"/>
+                    </a:lnR>
+                    <a:lnT w="6350" cap="flat" cmpd="sng" algn="ctr">
+                      <a:solidFill>
+                        <a:srgbClr val="000000"/>
+                      </a:solidFill>
+                      <a:prstDash val="solid"/>
+                      <a:round/>
+                      <a:headEnd type="none" w="med" len="med"/>
+                      <a:tailEnd type="none" w="med" len="med"/>
+                    </a:lnT>
+                    <a:lnB w="6350" cap="flat" cmpd="sng" algn="ctr">
+                      <a:solidFill>
+                        <a:srgbClr val="000000"/>
+                      </a:solidFill>
+                      <a:prstDash val="solid"/>
+                      <a:round/>
+                      <a:headEnd type="none" w="med" len="med"/>
+                      <a:tailEnd type="none" w="med" len="med"/>
+                    </a:lnB>
+                    <a:noFill/>
+                  </a:tcPr>
+                </a:tc>
+                <a:tc>
+                  <a:txBody>
+                    <a:bodyPr/>
+                    <a:lstStyle/>
+                    <a:p>
+                      <a:pPr algn="ctr" fontAlgn="b"/>
+                      <a:r>
+                        <a:rPr lang="en-US" sz="1100" b="0" i="0" u="none" strike="noStrike" dirty="0">
+                          <a:solidFill>
+                            <a:srgbClr val="000000"/>
+                          </a:solidFill>
+                          <a:effectLst/>
+                          <a:latin typeface="Aptos Narrow" panose="020B0004020202020204" pitchFamily="34" charset="0"/>
+                        </a:rPr>
+                        <a:t>0.92</a:t>
+                      </a:r>
+                    </a:p>
+                  </a:txBody>
+                  <a:tcPr marL="9525" marR="9525" marT="9525" marB="0" anchor="b">
+                    <a:lnL w="6350" cap="flat" cmpd="sng" algn="ctr">
+                      <a:solidFill>
+                        <a:srgbClr val="000000"/>
+                      </a:solidFill>
+                      <a:prstDash val="solid"/>
+                      <a:round/>
+                      <a:headEnd type="none" w="med" len="med"/>
+                      <a:tailEnd type="none" w="med" len="med"/>
+                    </a:lnL>
+                    <a:lnR w="6350" cap="flat" cmpd="sng" algn="ctr">
+                      <a:solidFill>
+                        <a:srgbClr val="000000"/>
+                      </a:solidFill>
+                      <a:prstDash val="solid"/>
+                      <a:round/>
+                      <a:headEnd type="none" w="med" len="med"/>
+                      <a:tailEnd type="none" w="med" len="med"/>
+                    </a:lnR>
+                    <a:lnT w="6350" cap="flat" cmpd="sng" algn="ctr">
+                      <a:solidFill>
+                        <a:srgbClr val="000000"/>
+                      </a:solidFill>
+                      <a:prstDash val="solid"/>
+                      <a:round/>
+                      <a:headEnd type="none" w="med" len="med"/>
+                      <a:tailEnd type="none" w="med" len="med"/>
+                    </a:lnT>
+                    <a:lnB w="6350" cap="flat" cmpd="sng" algn="ctr">
+                      <a:solidFill>
+                        <a:srgbClr val="000000"/>
+                      </a:solidFill>
+                      <a:prstDash val="solid"/>
+                      <a:round/>
+                      <a:headEnd type="none" w="med" len="med"/>
+                      <a:tailEnd type="none" w="med" len="med"/>
+                    </a:lnB>
+                    <a:noFill/>
+                  </a:tcPr>
+                </a:tc>
+                <a:tc>
+                  <a:txBody>
+                    <a:bodyPr/>
+                    <a:lstStyle/>
+                    <a:p>
+                      <a:pPr algn="ctr" fontAlgn="b"/>
+                      <a:r>
+                        <a:rPr lang="en-US" sz="1100" b="0" i="0" u="none" strike="noStrike" dirty="0">
+                          <a:solidFill>
+                            <a:srgbClr val="000000"/>
+                          </a:solidFill>
+                          <a:effectLst/>
+                          <a:latin typeface="Aptos Narrow" panose="020B0004020202020204" pitchFamily="34" charset="0"/>
+                        </a:rPr>
+                        <a:t>0.90</a:t>
+                      </a:r>
+                    </a:p>
+                  </a:txBody>
+                  <a:tcPr marL="9525" marR="9525" marT="9525" marB="0" anchor="b">
+                    <a:lnL w="6350" cap="flat" cmpd="sng" algn="ctr">
+                      <a:solidFill>
+                        <a:srgbClr val="000000"/>
+                      </a:solidFill>
+                      <a:prstDash val="solid"/>
+                      <a:round/>
+                      <a:headEnd type="none" w="med" len="med"/>
+                      <a:tailEnd type="none" w="med" len="med"/>
+                    </a:lnL>
+                    <a:lnR w="6350" cap="flat" cmpd="sng" algn="ctr">
+                      <a:solidFill>
+                        <a:srgbClr val="000000"/>
+                      </a:solidFill>
+                      <a:prstDash val="solid"/>
+                      <a:round/>
+                      <a:headEnd type="none" w="med" len="med"/>
+                      <a:tailEnd type="none" w="med" len="med"/>
+                    </a:lnR>
+                    <a:lnT w="6350" cap="flat" cmpd="sng" algn="ctr">
+                      <a:solidFill>
+                        <a:srgbClr val="000000"/>
+                      </a:solidFill>
+                      <a:prstDash val="solid"/>
+                      <a:round/>
+                      <a:headEnd type="none" w="med" len="med"/>
+                      <a:tailEnd type="none" w="med" len="med"/>
+                    </a:lnT>
+                    <a:lnB w="6350" cap="flat" cmpd="sng" algn="ctr">
+                      <a:solidFill>
+                        <a:srgbClr val="000000"/>
+                      </a:solidFill>
+                      <a:prstDash val="solid"/>
+                      <a:round/>
+                      <a:headEnd type="none" w="med" len="med"/>
+                      <a:tailEnd type="none" w="med" len="med"/>
+                    </a:lnB>
+                    <a:noFill/>
+                  </a:tcPr>
+                </a:tc>
+                <a:tc>
+                  <a:txBody>
+                    <a:bodyPr/>
+                    <a:lstStyle/>
+                    <a:p>
+                      <a:pPr algn="ctr" fontAlgn="b"/>
+                      <a:r>
+                        <a:rPr lang="en-US" sz="1100" b="0" i="0" u="none" strike="noStrike" dirty="0">
+                          <a:solidFill>
+                            <a:srgbClr val="000000"/>
+                          </a:solidFill>
+                          <a:effectLst/>
+                          <a:latin typeface="Aptos Narrow" panose="020B0004020202020204" pitchFamily="34" charset="0"/>
+                        </a:rPr>
+                        <a:t>88</a:t>
+                      </a:r>
+                    </a:p>
+                  </a:txBody>
+                  <a:tcPr marL="9525" marR="9525" marT="9525" marB="0" anchor="b">
+                    <a:lnL w="6350" cap="flat" cmpd="sng" algn="ctr">
+                      <a:solidFill>
+                        <a:srgbClr val="000000"/>
+                      </a:solidFill>
+                      <a:prstDash val="solid"/>
+                      <a:round/>
+                      <a:headEnd type="none" w="med" len="med"/>
+                      <a:tailEnd type="none" w="med" len="med"/>
+                    </a:lnL>
+                    <a:lnR w="6350" cap="flat" cmpd="sng" algn="ctr">
+                      <a:solidFill>
+                        <a:srgbClr val="000000"/>
+                      </a:solidFill>
+                      <a:prstDash val="solid"/>
+                      <a:round/>
+                      <a:headEnd type="none" w="med" len="med"/>
+                      <a:tailEnd type="none" w="med" len="med"/>
+                    </a:lnR>
+                    <a:lnT w="6350" cap="flat" cmpd="sng" algn="ctr">
+                      <a:solidFill>
+                        <a:srgbClr val="000000"/>
+                      </a:solidFill>
+                      <a:prstDash val="solid"/>
+                      <a:round/>
+                      <a:headEnd type="none" w="med" len="med"/>
+                      <a:tailEnd type="none" w="med" len="med"/>
+                    </a:lnT>
+                    <a:lnB w="6350" cap="flat" cmpd="sng" algn="ctr">
+                      <a:solidFill>
+                        <a:srgbClr val="000000"/>
+                      </a:solidFill>
+                      <a:prstDash val="solid"/>
+                      <a:round/>
+                      <a:headEnd type="none" w="med" len="med"/>
+                      <a:tailEnd type="none" w="med" len="med"/>
+                    </a:lnB>
+                    <a:noFill/>
+                  </a:tcPr>
+                </a:tc>
+                <a:extLst>
+                  <a:ext uri="{0D108BD9-81ED-4DB2-BD59-A6C34878D82A}">
+                    <a16:rowId xmlns:a16="http://schemas.microsoft.com/office/drawing/2014/main" val="21995739"/>
+                  </a:ext>
+                </a:extLst>
+              </a:tr>
+              <a:tr h="180975">
+                <a:tc>
+                  <a:txBody>
+                    <a:bodyPr/>
+                    <a:lstStyle/>
+                    <a:p>
+                      <a:pPr algn="ctr" fontAlgn="b"/>
+                      <a:r>
+                        <a:rPr lang="en-US" sz="1100" b="1" i="0" u="none" strike="noStrike" dirty="0">
+                          <a:solidFill>
+                            <a:srgbClr val="000000"/>
+                          </a:solidFill>
+                          <a:effectLst/>
+                          <a:latin typeface="Aptos Narrow" panose="020B0004020202020204" pitchFamily="34" charset="0"/>
+                        </a:rPr>
+                        <a:t>Tumor</a:t>
+                      </a:r>
+                    </a:p>
+                  </a:txBody>
+                  <a:tcPr marL="9525" marR="9525" marT="9525" marB="0" anchor="b">
+                    <a:lnL w="6350" cap="flat" cmpd="sng" algn="ctr">
+                      <a:solidFill>
+                        <a:srgbClr val="000000"/>
+                      </a:solidFill>
+                      <a:prstDash val="solid"/>
+                      <a:round/>
+                      <a:headEnd type="none" w="med" len="med"/>
+                      <a:tailEnd type="none" w="med" len="med"/>
+                    </a:lnL>
+                    <a:lnR w="6350" cap="flat" cmpd="sng" algn="ctr">
+                      <a:solidFill>
+                        <a:srgbClr val="000000"/>
+                      </a:solidFill>
+                      <a:prstDash val="solid"/>
+                      <a:round/>
+                      <a:headEnd type="none" w="med" len="med"/>
+                      <a:tailEnd type="none" w="med" len="med"/>
+                    </a:lnR>
+                    <a:lnT w="6350" cap="flat" cmpd="sng" algn="ctr">
+                      <a:solidFill>
+                        <a:srgbClr val="000000"/>
+                      </a:solidFill>
+                      <a:prstDash val="solid"/>
+                      <a:round/>
+                      <a:headEnd type="none" w="med" len="med"/>
+                      <a:tailEnd type="none" w="med" len="med"/>
+                    </a:lnT>
+                    <a:lnB w="6350" cap="flat" cmpd="sng" algn="ctr">
+                      <a:solidFill>
+                        <a:srgbClr val="000000"/>
+                      </a:solidFill>
+                      <a:prstDash val="solid"/>
+                      <a:round/>
+                      <a:headEnd type="none" w="med" len="med"/>
+                      <a:tailEnd type="none" w="med" len="med"/>
+                    </a:lnB>
+                    <a:noFill/>
+                  </a:tcPr>
+                </a:tc>
+                <a:tc>
+                  <a:txBody>
+                    <a:bodyPr/>
+                    <a:lstStyle/>
+                    <a:p>
+                      <a:pPr algn="ctr" fontAlgn="b"/>
+                      <a:r>
+                        <a:rPr lang="en-US" sz="1100" b="0" i="0" u="none" strike="noStrike" dirty="0">
+                          <a:solidFill>
+                            <a:srgbClr val="000000"/>
+                          </a:solidFill>
+                          <a:effectLst/>
+                          <a:latin typeface="Aptos Narrow" panose="020B0004020202020204" pitchFamily="34" charset="0"/>
+                        </a:rPr>
+                        <a:t>0.98</a:t>
+                      </a:r>
+                    </a:p>
+                  </a:txBody>
+                  <a:tcPr marL="9525" marR="9525" marT="9525" marB="0" anchor="b">
+                    <a:lnL w="6350" cap="flat" cmpd="sng" algn="ctr">
+                      <a:solidFill>
+                        <a:srgbClr val="000000"/>
+                      </a:solidFill>
+                      <a:prstDash val="solid"/>
+                      <a:round/>
+                      <a:headEnd type="none" w="med" len="med"/>
+                      <a:tailEnd type="none" w="med" len="med"/>
+                    </a:lnL>
+                    <a:lnR w="6350" cap="flat" cmpd="sng" algn="ctr">
+                      <a:solidFill>
+                        <a:srgbClr val="000000"/>
+                      </a:solidFill>
+                      <a:prstDash val="solid"/>
+                      <a:round/>
+                      <a:headEnd type="none" w="med" len="med"/>
+                      <a:tailEnd type="none" w="med" len="med"/>
+                    </a:lnR>
+                    <a:lnT w="6350" cap="flat" cmpd="sng" algn="ctr">
+                      <a:solidFill>
+                        <a:srgbClr val="000000"/>
+                      </a:solidFill>
+                      <a:prstDash val="solid"/>
+                      <a:round/>
+                      <a:headEnd type="none" w="med" len="med"/>
+                      <a:tailEnd type="none" w="med" len="med"/>
+                    </a:lnT>
+                    <a:lnB w="6350" cap="flat" cmpd="sng" algn="ctr">
+                      <a:solidFill>
+                        <a:srgbClr val="000000"/>
+                      </a:solidFill>
+                      <a:prstDash val="solid"/>
+                      <a:round/>
+                      <a:headEnd type="none" w="med" len="med"/>
+                      <a:tailEnd type="none" w="med" len="med"/>
+                    </a:lnB>
+                    <a:noFill/>
+                  </a:tcPr>
+                </a:tc>
+                <a:tc>
+                  <a:txBody>
+                    <a:bodyPr/>
+                    <a:lstStyle/>
+                    <a:p>
+                      <a:pPr algn="ctr" fontAlgn="b"/>
+                      <a:r>
+                        <a:rPr lang="en-US" sz="1100" b="0" i="0" u="none" strike="noStrike" dirty="0">
+                          <a:solidFill>
+                            <a:srgbClr val="000000"/>
+                          </a:solidFill>
+                          <a:effectLst/>
+                          <a:latin typeface="Aptos Narrow" panose="020B0004020202020204" pitchFamily="34" charset="0"/>
+                        </a:rPr>
+                        <a:t>0.98</a:t>
+                      </a:r>
+                    </a:p>
+                  </a:txBody>
+                  <a:tcPr marL="9525" marR="9525" marT="9525" marB="0" anchor="b">
+                    <a:lnL w="6350" cap="flat" cmpd="sng" algn="ctr">
+                      <a:solidFill>
+                        <a:srgbClr val="000000"/>
+                      </a:solidFill>
+                      <a:prstDash val="solid"/>
+                      <a:round/>
+                      <a:headEnd type="none" w="med" len="med"/>
+                      <a:tailEnd type="none" w="med" len="med"/>
+                    </a:lnL>
+                    <a:lnR w="6350" cap="flat" cmpd="sng" algn="ctr">
+                      <a:solidFill>
+                        <a:srgbClr val="000000"/>
+                      </a:solidFill>
+                      <a:prstDash val="solid"/>
+                      <a:round/>
+                      <a:headEnd type="none" w="med" len="med"/>
+                      <a:tailEnd type="none" w="med" len="med"/>
+                    </a:lnR>
+                    <a:lnT w="6350" cap="flat" cmpd="sng" algn="ctr">
+                      <a:solidFill>
+                        <a:srgbClr val="000000"/>
+                      </a:solidFill>
+                      <a:prstDash val="solid"/>
+                      <a:round/>
+                      <a:headEnd type="none" w="med" len="med"/>
+                      <a:tailEnd type="none" w="med" len="med"/>
+                    </a:lnT>
+                    <a:lnB w="6350" cap="flat" cmpd="sng" algn="ctr">
+                      <a:solidFill>
+                        <a:srgbClr val="000000"/>
+                      </a:solidFill>
+                      <a:prstDash val="solid"/>
+                      <a:round/>
+                      <a:headEnd type="none" w="med" len="med"/>
+                      <a:tailEnd type="none" w="med" len="med"/>
+                    </a:lnB>
+                    <a:noFill/>
+                  </a:tcPr>
+                </a:tc>
+                <a:tc>
+                  <a:txBody>
+                    <a:bodyPr/>
+                    <a:lstStyle/>
+                    <a:p>
+                      <a:pPr algn="ctr" fontAlgn="b"/>
+                      <a:r>
+                        <a:rPr lang="en-US" sz="1100" b="0" i="0" u="none" strike="noStrike" dirty="0">
+                          <a:solidFill>
+                            <a:srgbClr val="000000"/>
+                          </a:solidFill>
+                          <a:effectLst/>
+                          <a:latin typeface="Aptos Narrow" panose="020B0004020202020204" pitchFamily="34" charset="0"/>
+                        </a:rPr>
+                        <a:t>0.98</a:t>
+                      </a:r>
+                    </a:p>
+                  </a:txBody>
+                  <a:tcPr marL="9525" marR="9525" marT="9525" marB="0" anchor="b">
+                    <a:lnL w="6350" cap="flat" cmpd="sng" algn="ctr">
+                      <a:solidFill>
+                        <a:srgbClr val="000000"/>
+                      </a:solidFill>
+                      <a:prstDash val="solid"/>
+                      <a:round/>
+                      <a:headEnd type="none" w="med" len="med"/>
+                      <a:tailEnd type="none" w="med" len="med"/>
+                    </a:lnL>
+                    <a:lnR w="6350" cap="flat" cmpd="sng" algn="ctr">
+                      <a:solidFill>
+                        <a:srgbClr val="000000"/>
+                      </a:solidFill>
+                      <a:prstDash val="solid"/>
+                      <a:round/>
+                      <a:headEnd type="none" w="med" len="med"/>
+                      <a:tailEnd type="none" w="med" len="med"/>
+                    </a:lnR>
+                    <a:lnT w="6350" cap="flat" cmpd="sng" algn="ctr">
+                      <a:solidFill>
+                        <a:srgbClr val="000000"/>
+                      </a:solidFill>
+                      <a:prstDash val="solid"/>
+                      <a:round/>
+                      <a:headEnd type="none" w="med" len="med"/>
+                      <a:tailEnd type="none" w="med" len="med"/>
+                    </a:lnT>
+                    <a:lnB w="6350" cap="flat" cmpd="sng" algn="ctr">
+                      <a:solidFill>
+                        <a:srgbClr val="000000"/>
+                      </a:solidFill>
+                      <a:prstDash val="solid"/>
+                      <a:round/>
+                      <a:headEnd type="none" w="med" len="med"/>
+                      <a:tailEnd type="none" w="med" len="med"/>
+                    </a:lnB>
+                    <a:noFill/>
+                  </a:tcPr>
+                </a:tc>
+                <a:tc>
+                  <a:txBody>
+                    <a:bodyPr/>
+                    <a:lstStyle/>
+                    <a:p>
+                      <a:pPr algn="ctr" fontAlgn="b"/>
+                      <a:r>
+                        <a:rPr lang="en-US" sz="1100" b="0" i="0" u="none" strike="noStrike" dirty="0">
+                          <a:solidFill>
+                            <a:srgbClr val="000000"/>
+                          </a:solidFill>
+                          <a:effectLst/>
+                          <a:latin typeface="Aptos Narrow" panose="020B0004020202020204" pitchFamily="34" charset="0"/>
+                        </a:rPr>
+                        <a:t>459</a:t>
+                      </a:r>
+                    </a:p>
+                  </a:txBody>
+                  <a:tcPr marL="9525" marR="9525" marT="9525" marB="0" anchor="b">
+                    <a:lnL w="6350" cap="flat" cmpd="sng" algn="ctr">
+                      <a:solidFill>
+                        <a:srgbClr val="000000"/>
+                      </a:solidFill>
+                      <a:prstDash val="solid"/>
+                      <a:round/>
+                      <a:headEnd type="none" w="med" len="med"/>
+                      <a:tailEnd type="none" w="med" len="med"/>
+                    </a:lnL>
+                    <a:lnR w="6350" cap="flat" cmpd="sng" algn="ctr">
+                      <a:solidFill>
+                        <a:srgbClr val="000000"/>
+                      </a:solidFill>
+                      <a:prstDash val="solid"/>
+                      <a:round/>
+                      <a:headEnd type="none" w="med" len="med"/>
+                      <a:tailEnd type="none" w="med" len="med"/>
+                    </a:lnR>
+                    <a:lnT w="6350" cap="flat" cmpd="sng" algn="ctr">
+                      <a:solidFill>
+                        <a:srgbClr val="000000"/>
+                      </a:solidFill>
+                      <a:prstDash val="solid"/>
+                      <a:round/>
+                      <a:headEnd type="none" w="med" len="med"/>
+                      <a:tailEnd type="none" w="med" len="med"/>
+                    </a:lnT>
+                    <a:lnB w="6350" cap="flat" cmpd="sng" algn="ctr">
+                      <a:solidFill>
+                        <a:srgbClr val="000000"/>
+                      </a:solidFill>
+                      <a:prstDash val="solid"/>
+                      <a:round/>
+                      <a:headEnd type="none" w="med" len="med"/>
+                      <a:tailEnd type="none" w="med" len="med"/>
+                    </a:lnB>
+                    <a:noFill/>
+                  </a:tcPr>
+                </a:tc>
+                <a:extLst>
+                  <a:ext uri="{0D108BD9-81ED-4DB2-BD59-A6C34878D82A}">
+                    <a16:rowId xmlns:a16="http://schemas.microsoft.com/office/drawing/2014/main" val="2754436142"/>
+                  </a:ext>
+                </a:extLst>
+              </a:tr>
+              <a:tr h="180975">
+                <a:tc>
+                  <a:txBody>
+                    <a:bodyPr/>
+                    <a:lstStyle/>
+                    <a:p>
+                      <a:pPr algn="ctr" fontAlgn="b"/>
+                      <a:r>
+                        <a:rPr lang="en-US" sz="1100" b="1" i="0" u="none" strike="noStrike" dirty="0">
+                          <a:solidFill>
+                            <a:srgbClr val="000000"/>
+                          </a:solidFill>
+                          <a:effectLst/>
+                          <a:latin typeface="Aptos Narrow" panose="020B0004020202020204" pitchFamily="34" charset="0"/>
+                        </a:rPr>
+                        <a:t> </a:t>
+                      </a:r>
+                    </a:p>
+                  </a:txBody>
+                  <a:tcPr marL="9525" marR="9525" marT="9525" marB="0" anchor="b">
+                    <a:lnL w="6350" cap="flat" cmpd="sng" algn="ctr">
+                      <a:solidFill>
+                        <a:srgbClr val="000000"/>
+                      </a:solidFill>
+                      <a:prstDash val="solid"/>
+                      <a:round/>
+                      <a:headEnd type="none" w="med" len="med"/>
+                      <a:tailEnd type="none" w="med" len="med"/>
+                    </a:lnL>
+                    <a:lnR w="6350" cap="flat" cmpd="sng" algn="ctr">
+                      <a:solidFill>
+                        <a:srgbClr val="000000"/>
+                      </a:solidFill>
+                      <a:prstDash val="solid"/>
+                      <a:round/>
+                      <a:headEnd type="none" w="med" len="med"/>
+                      <a:tailEnd type="none" w="med" len="med"/>
+                    </a:lnR>
+                    <a:lnT w="6350" cap="flat" cmpd="sng" algn="ctr">
+                      <a:solidFill>
+                        <a:srgbClr val="000000"/>
+                      </a:solidFill>
+                      <a:prstDash val="solid"/>
+                      <a:round/>
+                      <a:headEnd type="none" w="med" len="med"/>
+                      <a:tailEnd type="none" w="med" len="med"/>
+                    </a:lnT>
+                    <a:lnB w="6350" cap="flat" cmpd="sng" algn="ctr">
+                      <a:solidFill>
+                        <a:srgbClr val="000000"/>
+                      </a:solidFill>
+                      <a:prstDash val="solid"/>
+                      <a:round/>
+                      <a:headEnd type="none" w="med" len="med"/>
+                      <a:tailEnd type="none" w="med" len="med"/>
+                    </a:lnB>
+                    <a:noFill/>
+                  </a:tcPr>
+                </a:tc>
+                <a:tc>
+                  <a:txBody>
+                    <a:bodyPr/>
+                    <a:lstStyle/>
+                    <a:p>
+                      <a:pPr algn="ctr" fontAlgn="b"/>
+                      <a:r>
+                        <a:rPr lang="en-US" sz="1100" b="0" i="0" u="none" strike="noStrike" dirty="0">
+                          <a:solidFill>
+                            <a:srgbClr val="000000"/>
+                          </a:solidFill>
+                          <a:effectLst/>
+                          <a:latin typeface="Aptos Narrow" panose="020B0004020202020204" pitchFamily="34" charset="0"/>
+                        </a:rPr>
+                        <a:t> </a:t>
+                      </a:r>
+                    </a:p>
+                  </a:txBody>
+                  <a:tcPr marL="9525" marR="9525" marT="9525" marB="0" anchor="b">
+                    <a:lnL w="6350" cap="flat" cmpd="sng" algn="ctr">
+                      <a:solidFill>
+                        <a:srgbClr val="000000"/>
+                      </a:solidFill>
+                      <a:prstDash val="solid"/>
+                      <a:round/>
+                      <a:headEnd type="none" w="med" len="med"/>
+                      <a:tailEnd type="none" w="med" len="med"/>
+                    </a:lnL>
+                    <a:lnR w="6350" cap="flat" cmpd="sng" algn="ctr">
+                      <a:solidFill>
+                        <a:srgbClr val="000000"/>
+                      </a:solidFill>
+                      <a:prstDash val="solid"/>
+                      <a:round/>
+                      <a:headEnd type="none" w="med" len="med"/>
+                      <a:tailEnd type="none" w="med" len="med"/>
+                    </a:lnR>
+                    <a:lnT w="6350" cap="flat" cmpd="sng" algn="ctr">
+                      <a:solidFill>
+                        <a:srgbClr val="000000"/>
+                      </a:solidFill>
+                      <a:prstDash val="solid"/>
+                      <a:round/>
+                      <a:headEnd type="none" w="med" len="med"/>
+                      <a:tailEnd type="none" w="med" len="med"/>
+                    </a:lnT>
+                    <a:lnB w="6350" cap="flat" cmpd="sng" algn="ctr">
+                      <a:solidFill>
+                        <a:srgbClr val="000000"/>
+                      </a:solidFill>
+                      <a:prstDash val="solid"/>
+                      <a:round/>
+                      <a:headEnd type="none" w="med" len="med"/>
+                      <a:tailEnd type="none" w="med" len="med"/>
+                    </a:lnB>
+                    <a:noFill/>
+                  </a:tcPr>
+                </a:tc>
+                <a:tc>
+                  <a:txBody>
+                    <a:bodyPr/>
+                    <a:lstStyle/>
+                    <a:p>
+                      <a:pPr algn="ctr" fontAlgn="b"/>
+                      <a:r>
+                        <a:rPr lang="en-US" sz="1100" b="0" i="0" u="none" strike="noStrike" dirty="0">
+                          <a:solidFill>
+                            <a:srgbClr val="000000"/>
+                          </a:solidFill>
+                          <a:effectLst/>
+                          <a:latin typeface="Aptos Narrow" panose="020B0004020202020204" pitchFamily="34" charset="0"/>
+                        </a:rPr>
+                        <a:t> </a:t>
+                      </a:r>
+                    </a:p>
+                  </a:txBody>
+                  <a:tcPr marL="9525" marR="9525" marT="9525" marB="0" anchor="b">
+                    <a:lnL w="6350" cap="flat" cmpd="sng" algn="ctr">
+                      <a:solidFill>
+                        <a:srgbClr val="000000"/>
+                      </a:solidFill>
+                      <a:prstDash val="solid"/>
+                      <a:round/>
+                      <a:headEnd type="none" w="med" len="med"/>
+                      <a:tailEnd type="none" w="med" len="med"/>
+                    </a:lnL>
+                    <a:lnR w="6350" cap="flat" cmpd="sng" algn="ctr">
+                      <a:solidFill>
+                        <a:srgbClr val="000000"/>
+                      </a:solidFill>
+                      <a:prstDash val="solid"/>
+                      <a:round/>
+                      <a:headEnd type="none" w="med" len="med"/>
+                      <a:tailEnd type="none" w="med" len="med"/>
+                    </a:lnR>
+                    <a:lnT w="6350" cap="flat" cmpd="sng" algn="ctr">
+                      <a:solidFill>
+                        <a:srgbClr val="000000"/>
+                      </a:solidFill>
+                      <a:prstDash val="solid"/>
+                      <a:round/>
+                      <a:headEnd type="none" w="med" len="med"/>
+                      <a:tailEnd type="none" w="med" len="med"/>
+                    </a:lnT>
+                    <a:lnB w="6350" cap="flat" cmpd="sng" algn="ctr">
+                      <a:solidFill>
+                        <a:srgbClr val="000000"/>
+                      </a:solidFill>
+                      <a:prstDash val="solid"/>
+                      <a:round/>
+                      <a:headEnd type="none" w="med" len="med"/>
+                      <a:tailEnd type="none" w="med" len="med"/>
+                    </a:lnB>
+                    <a:noFill/>
+                  </a:tcPr>
+                </a:tc>
+                <a:tc>
+                  <a:txBody>
+                    <a:bodyPr/>
+                    <a:lstStyle/>
+                    <a:p>
+                      <a:pPr algn="ctr" fontAlgn="b"/>
+                      <a:r>
+                        <a:rPr lang="en-US" sz="1100" b="0" i="0" u="none" strike="noStrike" dirty="0">
+                          <a:solidFill>
+                            <a:srgbClr val="000000"/>
+                          </a:solidFill>
+                          <a:effectLst/>
+                          <a:latin typeface="Aptos Narrow" panose="020B0004020202020204" pitchFamily="34" charset="0"/>
+                        </a:rPr>
+                        <a:t> </a:t>
+                      </a:r>
+                    </a:p>
+                  </a:txBody>
+                  <a:tcPr marL="9525" marR="9525" marT="9525" marB="0" anchor="b">
+                    <a:lnL w="6350" cap="flat" cmpd="sng" algn="ctr">
+                      <a:solidFill>
+                        <a:srgbClr val="000000"/>
+                      </a:solidFill>
+                      <a:prstDash val="solid"/>
+                      <a:round/>
+                      <a:headEnd type="none" w="med" len="med"/>
+                      <a:tailEnd type="none" w="med" len="med"/>
+                    </a:lnL>
+                    <a:lnR w="6350" cap="flat" cmpd="sng" algn="ctr">
+                      <a:solidFill>
+                        <a:srgbClr val="000000"/>
+                      </a:solidFill>
+                      <a:prstDash val="solid"/>
+                      <a:round/>
+                      <a:headEnd type="none" w="med" len="med"/>
+                      <a:tailEnd type="none" w="med" len="med"/>
+                    </a:lnR>
+                    <a:lnT w="6350" cap="flat" cmpd="sng" algn="ctr">
+                      <a:solidFill>
+                        <a:srgbClr val="000000"/>
+                      </a:solidFill>
+                      <a:prstDash val="solid"/>
+                      <a:round/>
+                      <a:headEnd type="none" w="med" len="med"/>
+                      <a:tailEnd type="none" w="med" len="med"/>
+                    </a:lnT>
+                    <a:lnB w="6350" cap="flat" cmpd="sng" algn="ctr">
+                      <a:solidFill>
+                        <a:srgbClr val="000000"/>
+                      </a:solidFill>
+                      <a:prstDash val="solid"/>
+                      <a:round/>
+                      <a:headEnd type="none" w="med" len="med"/>
+                      <a:tailEnd type="none" w="med" len="med"/>
+                    </a:lnB>
+                    <a:noFill/>
+                  </a:tcPr>
+                </a:tc>
+                <a:tc>
+                  <a:txBody>
+                    <a:bodyPr/>
+                    <a:lstStyle/>
+                    <a:p>
+                      <a:pPr algn="ctr" fontAlgn="b"/>
+                      <a:r>
+                        <a:rPr lang="en-US" sz="1100" b="0" i="0" u="none" strike="noStrike" dirty="0">
+                          <a:solidFill>
+                            <a:srgbClr val="000000"/>
+                          </a:solidFill>
+                          <a:effectLst/>
+                          <a:latin typeface="Aptos Narrow" panose="020B0004020202020204" pitchFamily="34" charset="0"/>
+                        </a:rPr>
+                        <a:t> </a:t>
+                      </a:r>
+                    </a:p>
+                  </a:txBody>
+                  <a:tcPr marL="9525" marR="9525" marT="9525" marB="0" anchor="b">
+                    <a:lnL w="6350" cap="flat" cmpd="sng" algn="ctr">
+                      <a:solidFill>
+                        <a:srgbClr val="000000"/>
+                      </a:solidFill>
+                      <a:prstDash val="solid"/>
+                      <a:round/>
+                      <a:headEnd type="none" w="med" len="med"/>
+                      <a:tailEnd type="none" w="med" len="med"/>
+                    </a:lnL>
+                    <a:lnR w="6350" cap="flat" cmpd="sng" algn="ctr">
+                      <a:solidFill>
+                        <a:srgbClr val="000000"/>
+                      </a:solidFill>
+                      <a:prstDash val="solid"/>
+                      <a:round/>
+                      <a:headEnd type="none" w="med" len="med"/>
+                      <a:tailEnd type="none" w="med" len="med"/>
+                    </a:lnR>
+                    <a:lnT w="6350" cap="flat" cmpd="sng" algn="ctr">
+                      <a:solidFill>
+                        <a:srgbClr val="000000"/>
+                      </a:solidFill>
+                      <a:prstDash val="solid"/>
+                      <a:round/>
+                      <a:headEnd type="none" w="med" len="med"/>
+                      <a:tailEnd type="none" w="med" len="med"/>
+                    </a:lnT>
+                    <a:lnB w="6350" cap="flat" cmpd="sng" algn="ctr">
+                      <a:solidFill>
+                        <a:srgbClr val="000000"/>
+                      </a:solidFill>
+                      <a:prstDash val="solid"/>
+                      <a:round/>
+                      <a:headEnd type="none" w="med" len="med"/>
+                      <a:tailEnd type="none" w="med" len="med"/>
+                    </a:lnB>
+                    <a:noFill/>
+                  </a:tcPr>
+                </a:tc>
+                <a:extLst>
+                  <a:ext uri="{0D108BD9-81ED-4DB2-BD59-A6C34878D82A}">
+                    <a16:rowId xmlns:a16="http://schemas.microsoft.com/office/drawing/2014/main" val="1265145423"/>
+                  </a:ext>
+                </a:extLst>
+              </a:tr>
+              <a:tr h="180975">
+                <a:tc>
+                  <a:txBody>
+                    <a:bodyPr/>
+                    <a:lstStyle/>
+                    <a:p>
+                      <a:pPr algn="ctr" fontAlgn="b"/>
+                      <a:r>
+                        <a:rPr lang="en-US" sz="1100" b="1" i="0" u="none" strike="noStrike" dirty="0">
+                          <a:solidFill>
+                            <a:srgbClr val="000000"/>
+                          </a:solidFill>
+                          <a:effectLst/>
+                          <a:latin typeface="Aptos Narrow" panose="020B0004020202020204" pitchFamily="34" charset="0"/>
+                        </a:rPr>
+                        <a:t>accuracy</a:t>
+                      </a:r>
+                    </a:p>
+                  </a:txBody>
+                  <a:tcPr marL="9525" marR="9525" marT="9525" marB="0" anchor="b">
+                    <a:lnL w="6350" cap="flat" cmpd="sng" algn="ctr">
+                      <a:solidFill>
+                        <a:srgbClr val="000000"/>
+                      </a:solidFill>
+                      <a:prstDash val="solid"/>
+                      <a:round/>
+                      <a:headEnd type="none" w="med" len="med"/>
+                      <a:tailEnd type="none" w="med" len="med"/>
+                    </a:lnL>
+                    <a:lnR w="6350" cap="flat" cmpd="sng" algn="ctr">
+                      <a:solidFill>
+                        <a:srgbClr val="000000"/>
+                      </a:solidFill>
+                      <a:prstDash val="solid"/>
+                      <a:round/>
+                      <a:headEnd type="none" w="med" len="med"/>
+                      <a:tailEnd type="none" w="med" len="med"/>
+                    </a:lnR>
+                    <a:lnT w="6350" cap="flat" cmpd="sng" algn="ctr">
+                      <a:solidFill>
+                        <a:srgbClr val="000000"/>
+                      </a:solidFill>
+                      <a:prstDash val="solid"/>
+                      <a:round/>
+                      <a:headEnd type="none" w="med" len="med"/>
+                      <a:tailEnd type="none" w="med" len="med"/>
+                    </a:lnT>
+                    <a:lnB w="6350" cap="flat" cmpd="sng" algn="ctr">
+                      <a:solidFill>
+                        <a:srgbClr val="000000"/>
+                      </a:solidFill>
+                      <a:prstDash val="solid"/>
+                      <a:round/>
+                      <a:headEnd type="none" w="med" len="med"/>
+                      <a:tailEnd type="none" w="med" len="med"/>
+                    </a:lnB>
+                    <a:noFill/>
+                  </a:tcPr>
+                </a:tc>
+                <a:tc>
+                  <a:txBody>
+                    <a:bodyPr/>
+                    <a:lstStyle/>
+                    <a:p>
+                      <a:pPr algn="ctr" fontAlgn="b"/>
+                      <a:r>
+                        <a:rPr lang="en-US" sz="1100" b="0" i="0" u="none" strike="noStrike" dirty="0">
+                          <a:solidFill>
+                            <a:srgbClr val="000000"/>
+                          </a:solidFill>
+                          <a:effectLst/>
+                          <a:latin typeface="Aptos Narrow" panose="020B0004020202020204" pitchFamily="34" charset="0"/>
+                        </a:rPr>
+                        <a:t> </a:t>
+                      </a:r>
+                    </a:p>
+                  </a:txBody>
+                  <a:tcPr marL="9525" marR="9525" marT="9525" marB="0" anchor="b">
+                    <a:lnL w="6350" cap="flat" cmpd="sng" algn="ctr">
+                      <a:solidFill>
+                        <a:srgbClr val="000000"/>
+                      </a:solidFill>
+                      <a:prstDash val="solid"/>
+                      <a:round/>
+                      <a:headEnd type="none" w="med" len="med"/>
+                      <a:tailEnd type="none" w="med" len="med"/>
+                    </a:lnL>
+                    <a:lnR w="6350" cap="flat" cmpd="sng" algn="ctr">
+                      <a:solidFill>
+                        <a:srgbClr val="000000"/>
+                      </a:solidFill>
+                      <a:prstDash val="solid"/>
+                      <a:round/>
+                      <a:headEnd type="none" w="med" len="med"/>
+                      <a:tailEnd type="none" w="med" len="med"/>
+                    </a:lnR>
+                    <a:lnT w="6350" cap="flat" cmpd="sng" algn="ctr">
+                      <a:solidFill>
+                        <a:srgbClr val="000000"/>
+                      </a:solidFill>
+                      <a:prstDash val="solid"/>
+                      <a:round/>
+                      <a:headEnd type="none" w="med" len="med"/>
+                      <a:tailEnd type="none" w="med" len="med"/>
+                    </a:lnT>
+                    <a:lnB w="6350" cap="flat" cmpd="sng" algn="ctr">
+                      <a:solidFill>
+                        <a:srgbClr val="000000"/>
+                      </a:solidFill>
+                      <a:prstDash val="solid"/>
+                      <a:round/>
+                      <a:headEnd type="none" w="med" len="med"/>
+                      <a:tailEnd type="none" w="med" len="med"/>
+                    </a:lnB>
+                    <a:noFill/>
+                  </a:tcPr>
+                </a:tc>
+                <a:tc>
+                  <a:txBody>
+                    <a:bodyPr/>
+                    <a:lstStyle/>
+                    <a:p>
+                      <a:pPr algn="ctr" fontAlgn="b"/>
+                      <a:r>
+                        <a:rPr lang="en-US" sz="1100" b="0" i="0" u="none" strike="noStrike" dirty="0">
+                          <a:solidFill>
+                            <a:srgbClr val="000000"/>
+                          </a:solidFill>
+                          <a:effectLst/>
+                          <a:latin typeface="Aptos Narrow" panose="020B0004020202020204" pitchFamily="34" charset="0"/>
+                        </a:rPr>
+                        <a:t> </a:t>
+                      </a:r>
+                    </a:p>
+                  </a:txBody>
+                  <a:tcPr marL="9525" marR="9525" marT="9525" marB="0" anchor="b">
+                    <a:lnL w="6350" cap="flat" cmpd="sng" algn="ctr">
+                      <a:solidFill>
+                        <a:srgbClr val="000000"/>
+                      </a:solidFill>
+                      <a:prstDash val="solid"/>
+                      <a:round/>
+                      <a:headEnd type="none" w="med" len="med"/>
+                      <a:tailEnd type="none" w="med" len="med"/>
+                    </a:lnL>
+                    <a:lnR w="6350" cap="flat" cmpd="sng" algn="ctr">
+                      <a:solidFill>
+                        <a:srgbClr val="000000"/>
+                      </a:solidFill>
+                      <a:prstDash val="solid"/>
+                      <a:round/>
+                      <a:headEnd type="none" w="med" len="med"/>
+                      <a:tailEnd type="none" w="med" len="med"/>
+                    </a:lnR>
+                    <a:lnT w="6350" cap="flat" cmpd="sng" algn="ctr">
+                      <a:solidFill>
+                        <a:srgbClr val="000000"/>
+                      </a:solidFill>
+                      <a:prstDash val="solid"/>
+                      <a:round/>
+                      <a:headEnd type="none" w="med" len="med"/>
+                      <a:tailEnd type="none" w="med" len="med"/>
+                    </a:lnT>
+                    <a:lnB w="6350" cap="flat" cmpd="sng" algn="ctr">
+                      <a:solidFill>
+                        <a:srgbClr val="000000"/>
+                      </a:solidFill>
+                      <a:prstDash val="solid"/>
+                      <a:round/>
+                      <a:headEnd type="none" w="med" len="med"/>
+                      <a:tailEnd type="none" w="med" len="med"/>
+                    </a:lnB>
+                    <a:noFill/>
+                  </a:tcPr>
+                </a:tc>
+                <a:tc>
+                  <a:txBody>
+                    <a:bodyPr/>
+                    <a:lstStyle/>
+                    <a:p>
+                      <a:pPr algn="ctr" fontAlgn="b"/>
+                      <a:r>
+                        <a:rPr lang="en-US" sz="1100" b="0" i="0" u="none" strike="noStrike" dirty="0">
+                          <a:solidFill>
+                            <a:srgbClr val="000000"/>
+                          </a:solidFill>
+                          <a:effectLst/>
+                          <a:latin typeface="Aptos Narrow" panose="020B0004020202020204" pitchFamily="34" charset="0"/>
+                        </a:rPr>
+                        <a:t>0.97</a:t>
+                      </a:r>
+                    </a:p>
+                  </a:txBody>
+                  <a:tcPr marL="9525" marR="9525" marT="9525" marB="0" anchor="b">
+                    <a:lnL w="6350" cap="flat" cmpd="sng" algn="ctr">
+                      <a:solidFill>
+                        <a:srgbClr val="000000"/>
+                      </a:solidFill>
+                      <a:prstDash val="solid"/>
+                      <a:round/>
+                      <a:headEnd type="none" w="med" len="med"/>
+                      <a:tailEnd type="none" w="med" len="med"/>
+                    </a:lnL>
+                    <a:lnR w="6350" cap="flat" cmpd="sng" algn="ctr">
+                      <a:solidFill>
+                        <a:srgbClr val="000000"/>
+                      </a:solidFill>
+                      <a:prstDash val="solid"/>
+                      <a:round/>
+                      <a:headEnd type="none" w="med" len="med"/>
+                      <a:tailEnd type="none" w="med" len="med"/>
+                    </a:lnR>
+                    <a:lnT w="6350" cap="flat" cmpd="sng" algn="ctr">
+                      <a:solidFill>
+                        <a:srgbClr val="000000"/>
+                      </a:solidFill>
+                      <a:prstDash val="solid"/>
+                      <a:round/>
+                      <a:headEnd type="none" w="med" len="med"/>
+                      <a:tailEnd type="none" w="med" len="med"/>
+                    </a:lnT>
+                    <a:lnB w="6350" cap="flat" cmpd="sng" algn="ctr">
+                      <a:solidFill>
+                        <a:srgbClr val="000000"/>
+                      </a:solidFill>
+                      <a:prstDash val="solid"/>
+                      <a:round/>
+                      <a:headEnd type="none" w="med" len="med"/>
+                      <a:tailEnd type="none" w="med" len="med"/>
+                    </a:lnB>
+                    <a:noFill/>
+                  </a:tcPr>
+                </a:tc>
+                <a:tc>
+                  <a:txBody>
+                    <a:bodyPr/>
+                    <a:lstStyle/>
+                    <a:p>
+                      <a:pPr algn="ctr" fontAlgn="b"/>
+                      <a:r>
+                        <a:rPr lang="en-US" sz="1100" b="0" i="0" u="none" strike="noStrike" dirty="0">
+                          <a:solidFill>
+                            <a:srgbClr val="000000"/>
+                          </a:solidFill>
+                          <a:effectLst/>
+                          <a:latin typeface="Aptos Narrow" panose="020B0004020202020204" pitchFamily="34" charset="0"/>
+                        </a:rPr>
+                        <a:t>547</a:t>
+                      </a:r>
+                    </a:p>
+                  </a:txBody>
+                  <a:tcPr marL="9525" marR="9525" marT="9525" marB="0" anchor="b">
+                    <a:lnL w="6350" cap="flat" cmpd="sng" algn="ctr">
+                      <a:solidFill>
+                        <a:srgbClr val="000000"/>
+                      </a:solidFill>
+                      <a:prstDash val="solid"/>
+                      <a:round/>
+                      <a:headEnd type="none" w="med" len="med"/>
+                      <a:tailEnd type="none" w="med" len="med"/>
+                    </a:lnL>
+                    <a:lnR w="6350" cap="flat" cmpd="sng" algn="ctr">
+                      <a:solidFill>
+                        <a:srgbClr val="000000"/>
+                      </a:solidFill>
+                      <a:prstDash val="solid"/>
+                      <a:round/>
+                      <a:headEnd type="none" w="med" len="med"/>
+                      <a:tailEnd type="none" w="med" len="med"/>
+                    </a:lnR>
+                    <a:lnT w="6350" cap="flat" cmpd="sng" algn="ctr">
+                      <a:solidFill>
+                        <a:srgbClr val="000000"/>
+                      </a:solidFill>
+                      <a:prstDash val="solid"/>
+                      <a:round/>
+                      <a:headEnd type="none" w="med" len="med"/>
+                      <a:tailEnd type="none" w="med" len="med"/>
+                    </a:lnT>
+                    <a:lnB w="6350" cap="flat" cmpd="sng" algn="ctr">
+                      <a:solidFill>
+                        <a:srgbClr val="000000"/>
+                      </a:solidFill>
+                      <a:prstDash val="solid"/>
+                      <a:round/>
+                      <a:headEnd type="none" w="med" len="med"/>
+                      <a:tailEnd type="none" w="med" len="med"/>
+                    </a:lnB>
+                    <a:noFill/>
+                  </a:tcPr>
+                </a:tc>
+                <a:extLst>
+                  <a:ext uri="{0D108BD9-81ED-4DB2-BD59-A6C34878D82A}">
+                    <a16:rowId xmlns:a16="http://schemas.microsoft.com/office/drawing/2014/main" val="2146296654"/>
+                  </a:ext>
+                </a:extLst>
+              </a:tr>
+              <a:tr h="180975">
+                <a:tc>
+                  <a:txBody>
+                    <a:bodyPr/>
+                    <a:lstStyle/>
+                    <a:p>
+                      <a:pPr algn="ctr" fontAlgn="b"/>
+                      <a:r>
+                        <a:rPr lang="en-US" sz="1100" b="1" i="0" u="none" strike="noStrike" dirty="0">
+                          <a:solidFill>
+                            <a:srgbClr val="000000"/>
+                          </a:solidFill>
+                          <a:effectLst/>
+                          <a:latin typeface="Aptos Narrow" panose="020B0004020202020204" pitchFamily="34" charset="0"/>
+                        </a:rPr>
+                        <a:t>macro avg</a:t>
+                      </a:r>
+                    </a:p>
+                  </a:txBody>
+                  <a:tcPr marL="9525" marR="9525" marT="9525" marB="0" anchor="b">
+                    <a:lnL w="6350" cap="flat" cmpd="sng" algn="ctr">
+                      <a:solidFill>
+                        <a:srgbClr val="000000"/>
+                      </a:solidFill>
+                      <a:prstDash val="solid"/>
+                      <a:round/>
+                      <a:headEnd type="none" w="med" len="med"/>
+                      <a:tailEnd type="none" w="med" len="med"/>
+                    </a:lnL>
+                    <a:lnR w="6350" cap="flat" cmpd="sng" algn="ctr">
+                      <a:solidFill>
+                        <a:srgbClr val="000000"/>
+                      </a:solidFill>
+                      <a:prstDash val="solid"/>
+                      <a:round/>
+                      <a:headEnd type="none" w="med" len="med"/>
+                      <a:tailEnd type="none" w="med" len="med"/>
+                    </a:lnR>
+                    <a:lnT w="6350" cap="flat" cmpd="sng" algn="ctr">
+                      <a:solidFill>
+                        <a:srgbClr val="000000"/>
+                      </a:solidFill>
+                      <a:prstDash val="solid"/>
+                      <a:round/>
+                      <a:headEnd type="none" w="med" len="med"/>
+                      <a:tailEnd type="none" w="med" len="med"/>
+                    </a:lnT>
+                    <a:lnB w="6350" cap="flat" cmpd="sng" algn="ctr">
+                      <a:solidFill>
+                        <a:srgbClr val="000000"/>
+                      </a:solidFill>
+                      <a:prstDash val="solid"/>
+                      <a:round/>
+                      <a:headEnd type="none" w="med" len="med"/>
+                      <a:tailEnd type="none" w="med" len="med"/>
+                    </a:lnB>
+                    <a:noFill/>
+                  </a:tcPr>
+                </a:tc>
+                <a:tc>
+                  <a:txBody>
+                    <a:bodyPr/>
+                    <a:lstStyle/>
+                    <a:p>
+                      <a:pPr algn="ctr" fontAlgn="b"/>
+                      <a:r>
+                        <a:rPr lang="en-US" sz="1100" b="0" i="0" u="none" strike="noStrike" dirty="0">
+                          <a:solidFill>
+                            <a:srgbClr val="000000"/>
+                          </a:solidFill>
+                          <a:effectLst/>
+                          <a:latin typeface="Aptos Narrow" panose="020B0004020202020204" pitchFamily="34" charset="0"/>
+                        </a:rPr>
+                        <a:t>0.93</a:t>
+                      </a:r>
+                    </a:p>
+                  </a:txBody>
+                  <a:tcPr marL="9525" marR="9525" marT="9525" marB="0" anchor="b">
+                    <a:lnL w="6350" cap="flat" cmpd="sng" algn="ctr">
+                      <a:solidFill>
+                        <a:srgbClr val="000000"/>
+                      </a:solidFill>
+                      <a:prstDash val="solid"/>
+                      <a:round/>
+                      <a:headEnd type="none" w="med" len="med"/>
+                      <a:tailEnd type="none" w="med" len="med"/>
+                    </a:lnL>
+                    <a:lnR w="6350" cap="flat" cmpd="sng" algn="ctr">
+                      <a:solidFill>
+                        <a:srgbClr val="000000"/>
+                      </a:solidFill>
+                      <a:prstDash val="solid"/>
+                      <a:round/>
+                      <a:headEnd type="none" w="med" len="med"/>
+                      <a:tailEnd type="none" w="med" len="med"/>
+                    </a:lnR>
+                    <a:lnT w="6350" cap="flat" cmpd="sng" algn="ctr">
+                      <a:solidFill>
+                        <a:srgbClr val="000000"/>
+                      </a:solidFill>
+                      <a:prstDash val="solid"/>
+                      <a:round/>
+                      <a:headEnd type="none" w="med" len="med"/>
+                      <a:tailEnd type="none" w="med" len="med"/>
+                    </a:lnT>
+                    <a:lnB w="6350" cap="flat" cmpd="sng" algn="ctr">
+                      <a:solidFill>
+                        <a:srgbClr val="000000"/>
+                      </a:solidFill>
+                      <a:prstDash val="solid"/>
+                      <a:round/>
+                      <a:headEnd type="none" w="med" len="med"/>
+                      <a:tailEnd type="none" w="med" len="med"/>
+                    </a:lnB>
+                    <a:noFill/>
+                  </a:tcPr>
+                </a:tc>
+                <a:tc>
+                  <a:txBody>
+                    <a:bodyPr/>
+                    <a:lstStyle/>
+                    <a:p>
+                      <a:pPr algn="ctr" fontAlgn="b"/>
+                      <a:r>
+                        <a:rPr lang="en-US" sz="1100" b="0" i="0" u="none" strike="noStrike" dirty="0">
+                          <a:solidFill>
+                            <a:srgbClr val="000000"/>
+                          </a:solidFill>
+                          <a:effectLst/>
+                          <a:latin typeface="Aptos Narrow" panose="020B0004020202020204" pitchFamily="34" charset="0"/>
+                        </a:rPr>
+                        <a:t>0.95</a:t>
+                      </a:r>
+                    </a:p>
+                  </a:txBody>
+                  <a:tcPr marL="9525" marR="9525" marT="9525" marB="0" anchor="b">
+                    <a:lnL w="6350" cap="flat" cmpd="sng" algn="ctr">
+                      <a:solidFill>
+                        <a:srgbClr val="000000"/>
+                      </a:solidFill>
+                      <a:prstDash val="solid"/>
+                      <a:round/>
+                      <a:headEnd type="none" w="med" len="med"/>
+                      <a:tailEnd type="none" w="med" len="med"/>
+                    </a:lnL>
+                    <a:lnR w="6350" cap="flat" cmpd="sng" algn="ctr">
+                      <a:solidFill>
+                        <a:srgbClr val="000000"/>
+                      </a:solidFill>
+                      <a:prstDash val="solid"/>
+                      <a:round/>
+                      <a:headEnd type="none" w="med" len="med"/>
+                      <a:tailEnd type="none" w="med" len="med"/>
+                    </a:lnR>
+                    <a:lnT w="6350" cap="flat" cmpd="sng" algn="ctr">
+                      <a:solidFill>
+                        <a:srgbClr val="000000"/>
+                      </a:solidFill>
+                      <a:prstDash val="solid"/>
+                      <a:round/>
+                      <a:headEnd type="none" w="med" len="med"/>
+                      <a:tailEnd type="none" w="med" len="med"/>
+                    </a:lnT>
+                    <a:lnB w="6350" cap="flat" cmpd="sng" algn="ctr">
+                      <a:solidFill>
+                        <a:srgbClr val="000000"/>
+                      </a:solidFill>
+                      <a:prstDash val="solid"/>
+                      <a:round/>
+                      <a:headEnd type="none" w="med" len="med"/>
+                      <a:tailEnd type="none" w="med" len="med"/>
+                    </a:lnB>
+                    <a:noFill/>
+                  </a:tcPr>
+                </a:tc>
+                <a:tc>
+                  <a:txBody>
+                    <a:bodyPr/>
+                    <a:lstStyle/>
+                    <a:p>
+                      <a:pPr algn="ctr" fontAlgn="b"/>
+                      <a:r>
+                        <a:rPr lang="en-US" sz="1100" b="0" i="0" u="none" strike="noStrike" dirty="0">
+                          <a:solidFill>
+                            <a:srgbClr val="000000"/>
+                          </a:solidFill>
+                          <a:effectLst/>
+                          <a:latin typeface="Aptos Narrow" panose="020B0004020202020204" pitchFamily="34" charset="0"/>
+                        </a:rPr>
+                        <a:t>0.94</a:t>
+                      </a:r>
+                    </a:p>
+                  </a:txBody>
+                  <a:tcPr marL="9525" marR="9525" marT="9525" marB="0" anchor="b">
+                    <a:lnL w="6350" cap="flat" cmpd="sng" algn="ctr">
+                      <a:solidFill>
+                        <a:srgbClr val="000000"/>
+                      </a:solidFill>
+                      <a:prstDash val="solid"/>
+                      <a:round/>
+                      <a:headEnd type="none" w="med" len="med"/>
+                      <a:tailEnd type="none" w="med" len="med"/>
+                    </a:lnL>
+                    <a:lnR w="6350" cap="flat" cmpd="sng" algn="ctr">
+                      <a:solidFill>
+                        <a:srgbClr val="000000"/>
+                      </a:solidFill>
+                      <a:prstDash val="solid"/>
+                      <a:round/>
+                      <a:headEnd type="none" w="med" len="med"/>
+                      <a:tailEnd type="none" w="med" len="med"/>
+                    </a:lnR>
+                    <a:lnT w="6350" cap="flat" cmpd="sng" algn="ctr">
+                      <a:solidFill>
+                        <a:srgbClr val="000000"/>
+                      </a:solidFill>
+                      <a:prstDash val="solid"/>
+                      <a:round/>
+                      <a:headEnd type="none" w="med" len="med"/>
+                      <a:tailEnd type="none" w="med" len="med"/>
+                    </a:lnT>
+                    <a:lnB w="6350" cap="flat" cmpd="sng" algn="ctr">
+                      <a:solidFill>
+                        <a:srgbClr val="000000"/>
+                      </a:solidFill>
+                      <a:prstDash val="solid"/>
+                      <a:round/>
+                      <a:headEnd type="none" w="med" len="med"/>
+                      <a:tailEnd type="none" w="med" len="med"/>
+                    </a:lnB>
+                    <a:noFill/>
+                  </a:tcPr>
+                </a:tc>
+                <a:tc>
+                  <a:txBody>
+                    <a:bodyPr/>
+                    <a:lstStyle/>
+                    <a:p>
+                      <a:pPr algn="ctr" fontAlgn="b"/>
+                      <a:r>
+                        <a:rPr lang="en-US" sz="1100" b="0" i="0" u="none" strike="noStrike" dirty="0">
+                          <a:solidFill>
+                            <a:srgbClr val="000000"/>
+                          </a:solidFill>
+                          <a:effectLst/>
+                          <a:latin typeface="Aptos Narrow" panose="020B0004020202020204" pitchFamily="34" charset="0"/>
+                        </a:rPr>
+                        <a:t>547</a:t>
+                      </a:r>
+                    </a:p>
+                  </a:txBody>
+                  <a:tcPr marL="9525" marR="9525" marT="9525" marB="0" anchor="b">
+                    <a:lnL w="6350" cap="flat" cmpd="sng" algn="ctr">
+                      <a:solidFill>
+                        <a:srgbClr val="000000"/>
+                      </a:solidFill>
+                      <a:prstDash val="solid"/>
+                      <a:round/>
+                      <a:headEnd type="none" w="med" len="med"/>
+                      <a:tailEnd type="none" w="med" len="med"/>
+                    </a:lnL>
+                    <a:lnR w="6350" cap="flat" cmpd="sng" algn="ctr">
+                      <a:solidFill>
+                        <a:srgbClr val="000000"/>
+                      </a:solidFill>
+                      <a:prstDash val="solid"/>
+                      <a:round/>
+                      <a:headEnd type="none" w="med" len="med"/>
+                      <a:tailEnd type="none" w="med" len="med"/>
+                    </a:lnR>
+                    <a:lnT w="6350" cap="flat" cmpd="sng" algn="ctr">
+                      <a:solidFill>
+                        <a:srgbClr val="000000"/>
+                      </a:solidFill>
+                      <a:prstDash val="solid"/>
+                      <a:round/>
+                      <a:headEnd type="none" w="med" len="med"/>
+                      <a:tailEnd type="none" w="med" len="med"/>
+                    </a:lnT>
+                    <a:lnB w="6350" cap="flat" cmpd="sng" algn="ctr">
+                      <a:solidFill>
+                        <a:srgbClr val="000000"/>
+                      </a:solidFill>
+                      <a:prstDash val="solid"/>
+                      <a:round/>
+                      <a:headEnd type="none" w="med" len="med"/>
+                      <a:tailEnd type="none" w="med" len="med"/>
+                    </a:lnB>
+                    <a:noFill/>
+                  </a:tcPr>
+                </a:tc>
+                <a:extLst>
+                  <a:ext uri="{0D108BD9-81ED-4DB2-BD59-A6C34878D82A}">
+                    <a16:rowId xmlns:a16="http://schemas.microsoft.com/office/drawing/2014/main" val="3358729439"/>
+                  </a:ext>
+                </a:extLst>
+              </a:tr>
+              <a:tr h="180975">
+                <a:tc>
+                  <a:txBody>
+                    <a:bodyPr/>
+                    <a:lstStyle/>
+                    <a:p>
+                      <a:pPr algn="ctr" fontAlgn="b"/>
+                      <a:r>
+                        <a:rPr lang="en-US" sz="1100" b="1" i="0" u="none" strike="noStrike" dirty="0">
+                          <a:solidFill>
+                            <a:srgbClr val="000000"/>
+                          </a:solidFill>
+                          <a:effectLst/>
+                          <a:latin typeface="Aptos Narrow" panose="020B0004020202020204" pitchFamily="34" charset="0"/>
+                        </a:rPr>
+                        <a:t>weighted avg</a:t>
+                      </a:r>
+                    </a:p>
+                  </a:txBody>
+                  <a:tcPr marL="9525" marR="9525" marT="9525" marB="0" anchor="b">
+                    <a:lnL w="6350" cap="flat" cmpd="sng" algn="ctr">
+                      <a:solidFill>
+                        <a:srgbClr val="000000"/>
+                      </a:solidFill>
+                      <a:prstDash val="solid"/>
+                      <a:round/>
+                      <a:headEnd type="none" w="med" len="med"/>
+                      <a:tailEnd type="none" w="med" len="med"/>
+                    </a:lnL>
+                    <a:lnR w="6350" cap="flat" cmpd="sng" algn="ctr">
+                      <a:solidFill>
+                        <a:srgbClr val="000000"/>
+                      </a:solidFill>
+                      <a:prstDash val="solid"/>
+                      <a:round/>
+                      <a:headEnd type="none" w="med" len="med"/>
+                      <a:tailEnd type="none" w="med" len="med"/>
+                    </a:lnR>
+                    <a:lnT w="6350" cap="flat" cmpd="sng" algn="ctr">
+                      <a:solidFill>
+                        <a:srgbClr val="000000"/>
+                      </a:solidFill>
+                      <a:prstDash val="solid"/>
+                      <a:round/>
+                      <a:headEnd type="none" w="med" len="med"/>
+                      <a:tailEnd type="none" w="med" len="med"/>
+                    </a:lnT>
+                    <a:lnB w="6350" cap="flat" cmpd="sng" algn="ctr">
+                      <a:solidFill>
+                        <a:srgbClr val="000000"/>
+                      </a:solidFill>
+                      <a:prstDash val="solid"/>
+                      <a:round/>
+                      <a:headEnd type="none" w="med" len="med"/>
+                      <a:tailEnd type="none" w="med" len="med"/>
+                    </a:lnB>
+                    <a:noFill/>
+                  </a:tcPr>
+                </a:tc>
+                <a:tc>
+                  <a:txBody>
+                    <a:bodyPr/>
+                    <a:lstStyle/>
+                    <a:p>
+                      <a:pPr algn="ctr" fontAlgn="b"/>
+                      <a:r>
+                        <a:rPr lang="en-US" sz="1100" b="0" i="0" u="none" strike="noStrike" dirty="0">
+                          <a:solidFill>
+                            <a:srgbClr val="000000"/>
+                          </a:solidFill>
+                          <a:effectLst/>
+                          <a:latin typeface="Aptos Narrow" panose="020B0004020202020204" pitchFamily="34" charset="0"/>
+                        </a:rPr>
+                        <a:t>0.97</a:t>
+                      </a:r>
+                    </a:p>
+                  </a:txBody>
+                  <a:tcPr marL="9525" marR="9525" marT="9525" marB="0" anchor="b">
+                    <a:lnL w="6350" cap="flat" cmpd="sng" algn="ctr">
+                      <a:solidFill>
+                        <a:srgbClr val="000000"/>
+                      </a:solidFill>
+                      <a:prstDash val="solid"/>
+                      <a:round/>
+                      <a:headEnd type="none" w="med" len="med"/>
+                      <a:tailEnd type="none" w="med" len="med"/>
+                    </a:lnL>
+                    <a:lnR w="6350" cap="flat" cmpd="sng" algn="ctr">
+                      <a:solidFill>
+                        <a:srgbClr val="000000"/>
+                      </a:solidFill>
+                      <a:prstDash val="solid"/>
+                      <a:round/>
+                      <a:headEnd type="none" w="med" len="med"/>
+                      <a:tailEnd type="none" w="med" len="med"/>
+                    </a:lnR>
+                    <a:lnT w="6350" cap="flat" cmpd="sng" algn="ctr">
+                      <a:solidFill>
+                        <a:srgbClr val="000000"/>
+                      </a:solidFill>
+                      <a:prstDash val="solid"/>
+                      <a:round/>
+                      <a:headEnd type="none" w="med" len="med"/>
+                      <a:tailEnd type="none" w="med" len="med"/>
+                    </a:lnT>
+                    <a:lnB w="6350" cap="flat" cmpd="sng" algn="ctr">
+                      <a:solidFill>
+                        <a:srgbClr val="000000"/>
+                      </a:solidFill>
+                      <a:prstDash val="solid"/>
+                      <a:round/>
+                      <a:headEnd type="none" w="med" len="med"/>
+                      <a:tailEnd type="none" w="med" len="med"/>
+                    </a:lnB>
+                    <a:noFill/>
+                  </a:tcPr>
+                </a:tc>
+                <a:tc>
+                  <a:txBody>
+                    <a:bodyPr/>
+                    <a:lstStyle/>
+                    <a:p>
+                      <a:pPr algn="ctr" fontAlgn="b"/>
+                      <a:r>
+                        <a:rPr lang="en-US" sz="1100" b="0" i="0" u="none" strike="noStrike" dirty="0">
+                          <a:solidFill>
+                            <a:srgbClr val="000000"/>
+                          </a:solidFill>
+                          <a:effectLst/>
+                          <a:latin typeface="Aptos Narrow" panose="020B0004020202020204" pitchFamily="34" charset="0"/>
+                        </a:rPr>
+                        <a:t>0.97</a:t>
+                      </a:r>
+                    </a:p>
+                  </a:txBody>
+                  <a:tcPr marL="9525" marR="9525" marT="9525" marB="0" anchor="b">
+                    <a:lnL w="6350" cap="flat" cmpd="sng" algn="ctr">
+                      <a:solidFill>
+                        <a:srgbClr val="000000"/>
+                      </a:solidFill>
+                      <a:prstDash val="solid"/>
+                      <a:round/>
+                      <a:headEnd type="none" w="med" len="med"/>
+                      <a:tailEnd type="none" w="med" len="med"/>
+                    </a:lnL>
+                    <a:lnR w="6350" cap="flat" cmpd="sng" algn="ctr">
+                      <a:solidFill>
+                        <a:srgbClr val="000000"/>
+                      </a:solidFill>
+                      <a:prstDash val="solid"/>
+                      <a:round/>
+                      <a:headEnd type="none" w="med" len="med"/>
+                      <a:tailEnd type="none" w="med" len="med"/>
+                    </a:lnR>
+                    <a:lnT w="6350" cap="flat" cmpd="sng" algn="ctr">
+                      <a:solidFill>
+                        <a:srgbClr val="000000"/>
+                      </a:solidFill>
+                      <a:prstDash val="solid"/>
+                      <a:round/>
+                      <a:headEnd type="none" w="med" len="med"/>
+                      <a:tailEnd type="none" w="med" len="med"/>
+                    </a:lnT>
+                    <a:lnB w="6350" cap="flat" cmpd="sng" algn="ctr">
+                      <a:solidFill>
+                        <a:srgbClr val="000000"/>
+                      </a:solidFill>
+                      <a:prstDash val="solid"/>
+                      <a:round/>
+                      <a:headEnd type="none" w="med" len="med"/>
+                      <a:tailEnd type="none" w="med" len="med"/>
+                    </a:lnB>
+                    <a:noFill/>
+                  </a:tcPr>
+                </a:tc>
+                <a:tc>
+                  <a:txBody>
+                    <a:bodyPr/>
+                    <a:lstStyle/>
+                    <a:p>
+                      <a:pPr algn="ctr" fontAlgn="b"/>
+                      <a:r>
+                        <a:rPr lang="en-US" sz="1100" b="0" i="0" u="none" strike="noStrike" dirty="0">
+                          <a:solidFill>
+                            <a:srgbClr val="000000"/>
+                          </a:solidFill>
+                          <a:effectLst/>
+                          <a:latin typeface="Aptos Narrow" panose="020B0004020202020204" pitchFamily="34" charset="0"/>
+                        </a:rPr>
+                        <a:t>0.97</a:t>
+                      </a:r>
+                    </a:p>
+                  </a:txBody>
+                  <a:tcPr marL="9525" marR="9525" marT="9525" marB="0" anchor="b">
+                    <a:lnL w="6350" cap="flat" cmpd="sng" algn="ctr">
+                      <a:solidFill>
+                        <a:srgbClr val="000000"/>
+                      </a:solidFill>
+                      <a:prstDash val="solid"/>
+                      <a:round/>
+                      <a:headEnd type="none" w="med" len="med"/>
+                      <a:tailEnd type="none" w="med" len="med"/>
+                    </a:lnL>
+                    <a:lnR w="6350" cap="flat" cmpd="sng" algn="ctr">
+                      <a:solidFill>
+                        <a:srgbClr val="000000"/>
+                      </a:solidFill>
+                      <a:prstDash val="solid"/>
+                      <a:round/>
+                      <a:headEnd type="none" w="med" len="med"/>
+                      <a:tailEnd type="none" w="med" len="med"/>
+                    </a:lnR>
+                    <a:lnT w="6350" cap="flat" cmpd="sng" algn="ctr">
+                      <a:solidFill>
+                        <a:srgbClr val="000000"/>
+                      </a:solidFill>
+                      <a:prstDash val="solid"/>
+                      <a:round/>
+                      <a:headEnd type="none" w="med" len="med"/>
+                      <a:tailEnd type="none" w="med" len="med"/>
+                    </a:lnT>
+                    <a:lnB w="6350" cap="flat" cmpd="sng" algn="ctr">
+                      <a:solidFill>
+                        <a:srgbClr val="000000"/>
+                      </a:solidFill>
+                      <a:prstDash val="solid"/>
+                      <a:round/>
+                      <a:headEnd type="none" w="med" len="med"/>
+                      <a:tailEnd type="none" w="med" len="med"/>
+                    </a:lnB>
+                    <a:noFill/>
+                  </a:tcPr>
+                </a:tc>
+                <a:tc>
+                  <a:txBody>
+                    <a:bodyPr/>
+                    <a:lstStyle/>
+                    <a:p>
+                      <a:pPr algn="ctr" fontAlgn="b"/>
+                      <a:r>
+                        <a:rPr lang="en-US" sz="1100" b="0" i="0" u="none" strike="noStrike" dirty="0">
+                          <a:solidFill>
+                            <a:srgbClr val="000000"/>
+                          </a:solidFill>
+                          <a:effectLst/>
+                          <a:latin typeface="Aptos Narrow" panose="020B0004020202020204" pitchFamily="34" charset="0"/>
+                        </a:rPr>
+                        <a:t>547</a:t>
+                      </a:r>
+                    </a:p>
+                  </a:txBody>
+                  <a:tcPr marL="9525" marR="9525" marT="9525" marB="0" anchor="b">
+                    <a:lnL w="6350" cap="flat" cmpd="sng" algn="ctr">
+                      <a:solidFill>
+                        <a:srgbClr val="000000"/>
+                      </a:solidFill>
+                      <a:prstDash val="solid"/>
+                      <a:round/>
+                      <a:headEnd type="none" w="med" len="med"/>
+                      <a:tailEnd type="none" w="med" len="med"/>
+                    </a:lnL>
+                    <a:lnR w="6350" cap="flat" cmpd="sng" algn="ctr">
+                      <a:solidFill>
+                        <a:srgbClr val="000000"/>
+                      </a:solidFill>
+                      <a:prstDash val="solid"/>
+                      <a:round/>
+                      <a:headEnd type="none" w="med" len="med"/>
+                      <a:tailEnd type="none" w="med" len="med"/>
+                    </a:lnR>
+                    <a:lnT w="6350" cap="flat" cmpd="sng" algn="ctr">
+                      <a:solidFill>
+                        <a:srgbClr val="000000"/>
+                      </a:solidFill>
+                      <a:prstDash val="solid"/>
+                      <a:round/>
+                      <a:headEnd type="none" w="med" len="med"/>
+                      <a:tailEnd type="none" w="med" len="med"/>
+                    </a:lnT>
+                    <a:lnB w="6350" cap="flat" cmpd="sng" algn="ctr">
+                      <a:solidFill>
+                        <a:srgbClr val="000000"/>
+                      </a:solidFill>
+                      <a:prstDash val="solid"/>
+                      <a:round/>
+                      <a:headEnd type="none" w="med" len="med"/>
+                      <a:tailEnd type="none" w="med" len="med"/>
+                    </a:lnB>
+                    <a:noFill/>
+                  </a:tcPr>
+                </a:tc>
+                <a:extLst>
+                  <a:ext uri="{0D108BD9-81ED-4DB2-BD59-A6C34878D82A}">
+                    <a16:rowId xmlns:a16="http://schemas.microsoft.com/office/drawing/2014/main" val="2135589284"/>
+                  </a:ext>
+                </a:extLst>
+              </a:tr>
+            </a:tbl>
+          </a:graphicData>
+        </a:graphic>
+      </p:graphicFrame>
+      <p:pic>
+        <p:nvPicPr>
+          <p:cNvPr id="12" name="Picture 11">
+            <a:extLst>
+              <a:ext uri="{FF2B5EF4-FFF2-40B4-BE49-F238E27FC236}">
+                <a16:creationId xmlns:a16="http://schemas.microsoft.com/office/drawing/2014/main" id="{40BD095B-3F00-83E6-5BEE-A2C2EB41E406}"/>
+              </a:ext>
+            </a:extLst>
+          </p:cNvPr>
+          <p:cNvPicPr>
+            <a:picLocks noChangeAspect="1"/>
+          </p:cNvPicPr>
+          <p:nvPr/>
+        </p:nvPicPr>
+        <p:blipFill>
+          <a:blip r:embed="rId4"/>
+          <a:srcRect/>
+          <a:stretch/>
+        </p:blipFill>
+        <p:spPr>
+          <a:xfrm>
+            <a:off x="7446963" y="4403907"/>
+            <a:ext cx="3278187" cy="3476865"/>
+          </a:xfrm>
+          <a:prstGeom prst="rect">
+            <a:avLst/>
+          </a:prstGeom>
+        </p:spPr>
+      </p:pic>
+      <p:sp>
+        <p:nvSpPr>
+          <p:cNvPr id="13" name="Content Placeholder 1">
+            <a:extLst>
+              <a:ext uri="{FF2B5EF4-FFF2-40B4-BE49-F238E27FC236}">
+                <a16:creationId xmlns:a16="http://schemas.microsoft.com/office/drawing/2014/main" id="{64DF857A-EE9E-CA92-F0D0-626B1D441FB6}"/>
+              </a:ext>
+            </a:extLst>
+          </p:cNvPr>
+          <p:cNvSpPr>
+            <a:spLocks noGrp="1"/>
+          </p:cNvSpPr>
+          <p:nvPr>
+            <p:ph sz="half" idx="10"/>
+          </p:nvPr>
+        </p:nvSpPr>
+        <p:spPr>
+          <a:xfrm>
+            <a:off x="1104900" y="2114869"/>
+            <a:ext cx="5670550" cy="1155870"/>
+          </a:xfrm>
+        </p:spPr>
+        <p:txBody>
+          <a:bodyPr/>
+          <a:lstStyle/>
+          <a:p>
+            <a:pPr indent="0">
+              <a:buNone/>
+            </a:pPr>
+            <a:r>
+              <a:rPr lang="en-US" sz="2800" b="1" dirty="0">
+                <a:latin typeface="Century Gothic"/>
+              </a:rPr>
+              <a:t>Logistical Regression for Tumor/Normal Classification</a:t>
+            </a:r>
+            <a:endParaRPr lang="en-US" dirty="0"/>
+          </a:p>
+        </p:txBody>
+      </p:sp>
+      <p:pic>
+        <p:nvPicPr>
+          <p:cNvPr id="15" name="Picture 14">
+            <a:extLst>
+              <a:ext uri="{FF2B5EF4-FFF2-40B4-BE49-F238E27FC236}">
+                <a16:creationId xmlns:a16="http://schemas.microsoft.com/office/drawing/2014/main" id="{8FB0E844-DF75-D5AF-E92C-6C50E23880D1}"/>
+              </a:ext>
+            </a:extLst>
+          </p:cNvPr>
+          <p:cNvPicPr>
+            <a:picLocks noChangeAspect="1"/>
+          </p:cNvPicPr>
+          <p:nvPr/>
+        </p:nvPicPr>
+        <p:blipFill>
+          <a:blip r:embed="rId5"/>
+          <a:srcRect/>
+          <a:stretch/>
+        </p:blipFill>
+        <p:spPr>
+          <a:xfrm>
+            <a:off x="1288910" y="3840452"/>
+            <a:ext cx="4915663" cy="2525452"/>
+          </a:xfrm>
+          <a:prstGeom prst="rect">
+            <a:avLst/>
+          </a:prstGeom>
+        </p:spPr>
+      </p:pic>
+    </p:spTree>
+    <p:extLst>
+      <p:ext uri="{BB962C8B-B14F-4D97-AF65-F5344CB8AC3E}">
+        <p14:creationId xmlns:p14="http://schemas.microsoft.com/office/powerpoint/2010/main" val="4139828258"/>
+      </p:ext>
+    </p:extLst>
+  </p:cSld>
+  <p:clrMapOvr>
+    <a:masterClrMapping/>
+  </p:clrMapOvr>
   <mc:AlternateContent xmlns:mc="http://schemas.openxmlformats.org/markup-compatibility/2006">
     <mc:Choice xmlns:p14="http://schemas.microsoft.com/office/powerpoint/2010/main" Requires="p14">
       <p:transition spd="med" p14:dur="700">
@@ -12606,7 +15154,7 @@
 </p:sld>
 </file>
 
-<file path=ppt/slides/slide12.xml><?xml version="1.0" encoding="utf-8"?>
+<file path=ppt/slides/slide13.xml><?xml version="1.0" encoding="utf-8"?>
 <p:sld xmlns:a="http://schemas.openxmlformats.org/drawingml/2006/main" xmlns:r="http://schemas.openxmlformats.org/officeDocument/2006/relationships" xmlns:p="http://schemas.openxmlformats.org/presentationml/2006/main">
   <p:cSld>
     <p:spTree>
@@ -14976,13 +17524,13 @@
   <p:clrMapOvr>
     <a:masterClrMapping/>
   </p:clrMapOvr>
-  <mc:AlternateContent xmlns:mc="http://schemas.openxmlformats.org/markup-compatibility/2006">
-    <mc:Choice xmlns:p14="http://schemas.microsoft.com/office/powerpoint/2010/main" Requires="p14">
+  <mc:AlternateContent xmlns:mc="http://schemas.openxmlformats.org/markup-compatibility/2006" xmlns:p14="http://schemas.microsoft.com/office/powerpoint/2010/main">
+    <mc:Choice Requires="p14">
       <p:transition spd="med" p14:dur="700">
         <p:fade/>
       </p:transition>
     </mc:Choice>
-    <mc:Fallback>
+    <mc:Fallback xmlns="">
       <p:transition spd="med">
         <p:fade/>
       </p:transition>
@@ -14991,7 +17539,7 @@
 </p:sld>
 </file>
 
-<file path=ppt/slides/slide13.xml><?xml version="1.0" encoding="utf-8"?>
+<file path=ppt/slides/slide14.xml><?xml version="1.0" encoding="utf-8"?>
 <p:sld xmlns:a="http://schemas.openxmlformats.org/drawingml/2006/main" xmlns:r="http://schemas.openxmlformats.org/officeDocument/2006/relationships" xmlns:p="http://schemas.openxmlformats.org/presentationml/2006/main">
   <p:cSld>
     <p:spTree>
@@ -15030,7 +17578,7 @@
           <a:lstStyle/>
           <a:p>
             <a:r>
-              <a:rPr lang="en-US" sz="2400">
+              <a:rPr lang="en-US" sz="2400" dirty="0">
                 <a:latin typeface="Century Gothic"/>
               </a:rPr>
               <a:t>Our machine learning methods performed well when classifying samples as tumor / normal. (Accuracy &gt; 0.97).</a:t>
@@ -15042,7 +17590,7 @@
               <a:buChar char="o"/>
             </a:pPr>
             <a:r>
-              <a:rPr lang="en-US" sz="2000">
+              <a:rPr lang="en-US" sz="2000" dirty="0">
                 <a:latin typeface="Century Gothic"/>
               </a:rPr>
               <a:t>This suggests there could be potential for methods that are focuses on the early diagnosis of cancer based on methylation.</a:t>
@@ -15054,7 +17602,7 @@
               <a:buChar char="o"/>
             </a:pPr>
             <a:r>
-              <a:rPr lang="en-US" sz="2000">
+              <a:rPr lang="en-US" sz="2000" dirty="0">
                 <a:latin typeface="Century Gothic"/>
               </a:rPr>
               <a:t>Additional datasets are required for validation and to ensure against overfitting despite the efforts made.</a:t>
@@ -15062,11 +17610,11 @@
           </a:p>
           <a:p>
             <a:pPr indent="-182880"/>
-            <a:endParaRPr lang="en-US" sz="2400"/>
+            <a:endParaRPr lang="en-US" sz="2400" dirty="0"/>
           </a:p>
           <a:p>
             <a:r>
-              <a:rPr lang="en-US" sz="2400">
+              <a:rPr lang="en-US" sz="2400" dirty="0">
                 <a:latin typeface="Century Gothic"/>
               </a:rPr>
               <a:t>The identification of BRCA subtypes was more challenging with a wider gap in performance between supervised and unsupervised methods.</a:t>
@@ -15078,7 +17626,7 @@
               <a:buChar char="o"/>
             </a:pPr>
             <a:r>
-              <a:rPr lang="en-US" sz="2000">
+              <a:rPr lang="en-US" sz="2000" dirty="0">
                 <a:latin typeface="Century Gothic"/>
               </a:rPr>
               <a:t>The unsupervised clusters did not align well with previously established subtypes. More exploration into the characteristics of these unsupervised clusters could provide biological insight</a:t>
@@ -15090,19 +17638,19 @@
               <a:buChar char="o"/>
             </a:pPr>
             <a:r>
-              <a:rPr lang="en-US" sz="2000">
+              <a:rPr lang="en-US" sz="2000" dirty="0">
                 <a:latin typeface="Century Gothic"/>
               </a:rPr>
               <a:t>The supervised method mostly struggled in correctly classifying Luminal A and B samples. This could be reflecting a greater deal epigenetic heterogeneity within these subtypes.</a:t>
             </a:r>
-            <a:endParaRPr lang="en-US" sz="2000"/>
           </a:p>
           <a:p>
-            <a:pPr lvl="1" indent="-182880">
-              <a:buFont typeface="Courier New"/>
-              <a:buChar char="o"/>
+            <a:pPr indent="0">
+              <a:buNone/>
             </a:pPr>
-            <a:endParaRPr lang="en-US"/>
+            <a:endParaRPr lang="en-US" sz="2400" dirty="0">
+              <a:latin typeface="Century Gothic"/>
+            </a:endParaRPr>
           </a:p>
         </p:txBody>
       </p:sp>
@@ -15147,13 +17695,13 @@
   <p:clrMapOvr>
     <a:masterClrMapping/>
   </p:clrMapOvr>
-  <mc:AlternateContent xmlns:mc="http://schemas.openxmlformats.org/markup-compatibility/2006">
-    <mc:Choice xmlns:p14="http://schemas.microsoft.com/office/powerpoint/2010/main" Requires="p14">
+  <mc:AlternateContent xmlns:mc="http://schemas.openxmlformats.org/markup-compatibility/2006" xmlns:p14="http://schemas.microsoft.com/office/powerpoint/2010/main">
+    <mc:Choice Requires="p14">
       <p:transition spd="med" p14:dur="700">
         <p:fade/>
       </p:transition>
     </mc:Choice>
-    <mc:Fallback>
+    <mc:Fallback xmlns="">
       <p:transition spd="med">
         <p:fade/>
       </p:transition>
@@ -15162,7 +17710,7 @@
 </p:sld>
 </file>
 
-<file path=ppt/slides/slide14.xml><?xml version="1.0" encoding="utf-8"?>
+<file path=ppt/slides/slide15.xml><?xml version="1.0" encoding="utf-8"?>
 <p:sld xmlns:a="http://schemas.openxmlformats.org/drawingml/2006/main" xmlns:r="http://schemas.openxmlformats.org/officeDocument/2006/relationships" xmlns:p="http://schemas.openxmlformats.org/presentationml/2006/main">
   <p:cSld>
     <p:spTree>
@@ -15235,7 +17783,7 @@
             <p:ph sz="half" idx="10"/>
             <p:extLst>
               <p:ext uri="{D42A27DB-BD31-4B8C-83A1-F6EECF244321}">
-                <p14:modId xmlns:p14="http://schemas.microsoft.com/office/powerpoint/2010/main" val="2170275511"/>
+                <p14:modId xmlns:p14="http://schemas.microsoft.com/office/powerpoint/2010/main" val="2401174949"/>
               </p:ext>
             </p:extLst>
           </p:nvPr>
@@ -15260,13 +17808,13 @@
   <p:clrMapOvr>
     <a:masterClrMapping/>
   </p:clrMapOvr>
-  <mc:AlternateContent xmlns:mc="http://schemas.openxmlformats.org/markup-compatibility/2006">
-    <mc:Choice xmlns:p14="http://schemas.microsoft.com/office/powerpoint/2010/main" Requires="p14">
+  <mc:AlternateContent xmlns:mc="http://schemas.openxmlformats.org/markup-compatibility/2006" xmlns:p14="http://schemas.microsoft.com/office/powerpoint/2010/main">
+    <mc:Choice Requires="p14">
       <p:transition spd="med" p14:dur="700">
         <p:fade/>
       </p:transition>
     </mc:Choice>
-    <mc:Fallback>
+    <mc:Fallback xmlns="">
       <p:transition spd="med">
         <p:fade/>
       </p:transition>
@@ -15419,13 +17967,13 @@
   <p:clrMapOvr>
     <a:masterClrMapping/>
   </p:clrMapOvr>
-  <mc:AlternateContent xmlns:mc="http://schemas.openxmlformats.org/markup-compatibility/2006">
-    <mc:Choice xmlns:p14="http://schemas.microsoft.com/office/powerpoint/2010/main" Requires="p14">
+  <mc:AlternateContent xmlns:mc="http://schemas.openxmlformats.org/markup-compatibility/2006" xmlns:p14="http://schemas.microsoft.com/office/powerpoint/2010/main">
+    <mc:Choice Requires="p14">
       <p:transition spd="med" p14:dur="700">
         <p:fade/>
       </p:transition>
     </mc:Choice>
-    <mc:Fallback>
+    <mc:Fallback xmlns="">
       <p:transition spd="med">
         <p:fade/>
       </p:transition>
@@ -15557,13 +18105,13 @@
   <p:clrMapOvr>
     <a:masterClrMapping/>
   </p:clrMapOvr>
-  <mc:AlternateContent xmlns:mc="http://schemas.openxmlformats.org/markup-compatibility/2006">
-    <mc:Choice xmlns:p14="http://schemas.microsoft.com/office/powerpoint/2010/main" Requires="p14">
+  <mc:AlternateContent xmlns:mc="http://schemas.openxmlformats.org/markup-compatibility/2006" xmlns:p14="http://schemas.microsoft.com/office/powerpoint/2010/main">
+    <mc:Choice Requires="p14">
       <p:transition spd="med" p14:dur="700">
         <p:fade/>
       </p:transition>
     </mc:Choice>
-    <mc:Fallback>
+    <mc:Fallback xmlns="">
       <p:transition spd="med">
         <p:fade/>
       </p:transition>
@@ -15907,13 +18455,13 @@
   <p:clrMapOvr>
     <a:masterClrMapping/>
   </p:clrMapOvr>
-  <mc:AlternateContent xmlns:mc="http://schemas.openxmlformats.org/markup-compatibility/2006">
-    <mc:Choice xmlns:p14="http://schemas.microsoft.com/office/powerpoint/2010/main" Requires="p14">
+  <mc:AlternateContent xmlns:mc="http://schemas.openxmlformats.org/markup-compatibility/2006" xmlns:p14="http://schemas.microsoft.com/office/powerpoint/2010/main">
+    <mc:Choice Requires="p14">
       <p:transition spd="med" p14:dur="700">
         <p:fade/>
       </p:transition>
     </mc:Choice>
-    <mc:Fallback>
+    <mc:Fallback xmlns="">
       <p:transition spd="med">
         <p:fade/>
       </p:transition>
@@ -16122,13 +18670,13 @@
   <p:clrMapOvr>
     <a:masterClrMapping/>
   </p:clrMapOvr>
-  <mc:AlternateContent xmlns:mc="http://schemas.openxmlformats.org/markup-compatibility/2006">
-    <mc:Choice xmlns:p14="http://schemas.microsoft.com/office/powerpoint/2010/main" Requires="p14">
+  <mc:AlternateContent xmlns:mc="http://schemas.openxmlformats.org/markup-compatibility/2006" xmlns:p14="http://schemas.microsoft.com/office/powerpoint/2010/main">
+    <mc:Choice Requires="p14">
       <p:transition spd="med" p14:dur="700">
         <p:fade/>
       </p:transition>
     </mc:Choice>
-    <mc:Fallback>
+    <mc:Fallback xmlns="">
       <p:transition spd="med">
         <p:fade/>
       </p:transition>
@@ -16374,13 +18922,13 @@
   <p:clrMapOvr>
     <a:masterClrMapping/>
   </p:clrMapOvr>
-  <mc:AlternateContent xmlns:mc="http://schemas.openxmlformats.org/markup-compatibility/2006">
-    <mc:Choice xmlns:p14="http://schemas.microsoft.com/office/powerpoint/2010/main" Requires="p14">
+  <mc:AlternateContent xmlns:mc="http://schemas.openxmlformats.org/markup-compatibility/2006" xmlns:p14="http://schemas.microsoft.com/office/powerpoint/2010/main">
+    <mc:Choice Requires="p14">
       <p:transition spd="med" p14:dur="700">
         <p:fade/>
       </p:transition>
     </mc:Choice>
-    <mc:Fallback>
+    <mc:Fallback xmlns="">
       <p:transition spd="med">
         <p:fade/>
       </p:transition>
@@ -18770,13 +21318,13 @@
   <p:clrMapOvr>
     <a:masterClrMapping/>
   </p:clrMapOvr>
-  <mc:AlternateContent xmlns:mc="http://schemas.openxmlformats.org/markup-compatibility/2006">
-    <mc:Choice xmlns:p14="http://schemas.microsoft.com/office/powerpoint/2010/main" Requires="p14">
+  <mc:AlternateContent xmlns:mc="http://schemas.openxmlformats.org/markup-compatibility/2006" xmlns:p14="http://schemas.microsoft.com/office/powerpoint/2010/main">
+    <mc:Choice Requires="p14">
       <p:transition spd="med" p14:dur="700">
         <p:fade/>
       </p:transition>
     </mc:Choice>
-    <mc:Fallback>
+    <mc:Fallback xmlns="">
       <p:transition spd="med">
         <p:fade/>
       </p:transition>
@@ -21116,13 +23664,13 @@
   <p:clrMapOvr>
     <a:masterClrMapping/>
   </p:clrMapOvr>
-  <mc:AlternateContent xmlns:mc="http://schemas.openxmlformats.org/markup-compatibility/2006">
-    <mc:Choice xmlns:p14="http://schemas.microsoft.com/office/powerpoint/2010/main" Requires="p14">
+  <mc:AlternateContent xmlns:mc="http://schemas.openxmlformats.org/markup-compatibility/2006" xmlns:p14="http://schemas.microsoft.com/office/powerpoint/2010/main">
+    <mc:Choice Requires="p14">
       <p:transition spd="med" p14:dur="700">
         <p:fade/>
       </p:transition>
     </mc:Choice>
-    <mc:Fallback>
+    <mc:Fallback xmlns="">
       <p:transition spd="med">
         <p:fade/>
       </p:transition>
@@ -21487,13 +24035,13 @@
   <p:clrMapOvr>
     <a:masterClrMapping/>
   </p:clrMapOvr>
-  <mc:AlternateContent xmlns:mc="http://schemas.openxmlformats.org/markup-compatibility/2006">
-    <mc:Choice xmlns:p14="http://schemas.microsoft.com/office/powerpoint/2010/main" Requires="p14">
+  <mc:AlternateContent xmlns:mc="http://schemas.openxmlformats.org/markup-compatibility/2006" xmlns:p14="http://schemas.microsoft.com/office/powerpoint/2010/main">
+    <mc:Choice Requires="p14">
       <p:transition spd="med" p14:dur="700">
         <p:fade/>
       </p:transition>
     </mc:Choice>
-    <mc:Fallback>
+    <mc:Fallback xmlns="">
       <p:transition spd="med">
         <p:fade/>
       </p:transition>
@@ -22468,6 +25016,26 @@
 </file>
 
 <file path=customXml/item1.xml><?xml version="1.0" encoding="utf-8"?>
+<?mso-contentType ?>
+<FormTemplates xmlns="http://schemas.microsoft.com/sharepoint/v3/contenttype/forms">
+  <Display>DocumentLibraryForm</Display>
+  <Edit>DocumentLibraryForm</Edit>
+  <New>DocumentLibraryForm</New>
+</FormTemplates>
+</file>
+
+<file path=customXml/item2.xml><?xml version="1.0" encoding="utf-8"?>
+<p:properties xmlns:p="http://schemas.microsoft.com/office/2006/metadata/properties" xmlns:xsi="http://www.w3.org/2001/XMLSchema-instance" xmlns:pc="http://schemas.microsoft.com/office/infopath/2007/PartnerControls">
+  <documentManagement>
+    <lcf76f155ced4ddcb4097134ff3c332f xmlns="4c59eee7-cf13-43df-b7fb-891efb139330">
+      <Terms xmlns="http://schemas.microsoft.com/office/infopath/2007/PartnerControls"/>
+    </lcf76f155ced4ddcb4097134ff3c332f>
+    <TaxCatchAll xmlns="422c5ea7-0157-4c3f-8890-206c436c36de" xsi:nil="true"/>
+  </documentManagement>
+</p:properties>
+</file>
+
+<file path=customXml/item3.xml><?xml version="1.0" encoding="utf-8"?>
 <ct:contentTypeSchema xmlns:ct="http://schemas.microsoft.com/office/2006/metadata/contentType" xmlns:ma="http://schemas.microsoft.com/office/2006/metadata/properties/metaAttributes" ct:_="" ma:_="" ma:contentTypeName="Document" ma:contentTypeID="0x0101004865068D8639C346A9A37FB99A64ABC0" ma:contentTypeVersion="9" ma:contentTypeDescription="Create a new document." ma:contentTypeScope="" ma:versionID="2aa8d879d5da48b196ce2c91aba6c276">
   <xsd:schema xmlns:xsd="http://www.w3.org/2001/XMLSchema" xmlns:xs="http://www.w3.org/2001/XMLSchema" xmlns:p="http://schemas.microsoft.com/office/2006/metadata/properties" xmlns:ns2="4c59eee7-cf13-43df-b7fb-891efb139330" xmlns:ns3="422c5ea7-0157-4c3f-8890-206c436c36de" targetNamespace="http://schemas.microsoft.com/office/2006/metadata/properties" ma:root="true" ma:fieldsID="13c8d4177f7ab9df268d8fb10ec234ad" ns2:_="" ns3:_="">
     <xsd:import namespace="4c59eee7-cf13-43df-b7fb-891efb139330"/>
@@ -22650,41 +25218,10 @@
 </ct:contentTypeSchema>
 </file>
 
-<file path=customXml/item2.xml><?xml version="1.0" encoding="utf-8"?>
-<p:properties xmlns:p="http://schemas.microsoft.com/office/2006/metadata/properties" xmlns:xsi="http://www.w3.org/2001/XMLSchema-instance" xmlns:pc="http://schemas.microsoft.com/office/infopath/2007/PartnerControls">
-  <documentManagement>
-    <lcf76f155ced4ddcb4097134ff3c332f xmlns="4c59eee7-cf13-43df-b7fb-891efb139330">
-      <Terms xmlns="http://schemas.microsoft.com/office/infopath/2007/PartnerControls"/>
-    </lcf76f155ced4ddcb4097134ff3c332f>
-    <TaxCatchAll xmlns="422c5ea7-0157-4c3f-8890-206c436c36de" xsi:nil="true"/>
-  </documentManagement>
-</p:properties>
-</file>
-
-<file path=customXml/item3.xml><?xml version="1.0" encoding="utf-8"?>
-<?mso-contentType ?>
-<FormTemplates xmlns="http://schemas.microsoft.com/sharepoint/v3/contenttype/forms">
-  <Display>DocumentLibraryForm</Display>
-  <Edit>DocumentLibraryForm</Edit>
-  <New>DocumentLibraryForm</New>
-</FormTemplates>
-</file>
-
 <file path=customXml/itemProps1.xml><?xml version="1.0" encoding="utf-8"?>
-<ds:datastoreItem xmlns:ds="http://schemas.openxmlformats.org/officeDocument/2006/customXml" ds:itemID="{7582132D-9359-4DC4-8D90-1DE7D6586666}">
+<ds:datastoreItem xmlns:ds="http://schemas.openxmlformats.org/officeDocument/2006/customXml" ds:itemID="{38FAD308-4D6E-45DC-9A80-8E8E18C83510}">
   <ds:schemaRefs>
-    <ds:schemaRef ds:uri="422c5ea7-0157-4c3f-8890-206c436c36de"/>
-    <ds:schemaRef ds:uri="4c59eee7-cf13-43df-b7fb-891efb139330"/>
-    <ds:schemaRef ds:uri="http://purl.org/dc/elements/1.1/"/>
-    <ds:schemaRef ds:uri="http://purl.org/dc/terms/"/>
-    <ds:schemaRef ds:uri="http://schemas.microsoft.com/internal/obd"/>
-    <ds:schemaRef ds:uri="http://schemas.microsoft.com/office/2006/documentManagement/types"/>
-    <ds:schemaRef ds:uri="http://schemas.microsoft.com/office/2006/metadata/contentType"/>
-    <ds:schemaRef ds:uri="http://schemas.microsoft.com/office/2006/metadata/properties"/>
-    <ds:schemaRef ds:uri="http://schemas.microsoft.com/office/2006/metadata/properties/metaAttributes"/>
-    <ds:schemaRef ds:uri="http://schemas.microsoft.com/office/infopath/2007/PartnerControls"/>
-    <ds:schemaRef ds:uri="http://schemas.openxmlformats.org/package/2006/metadata/core-properties"/>
-    <ds:schemaRef ds:uri="http://www.w3.org/2001/XMLSchema"/>
+    <ds:schemaRef ds:uri="http://schemas.microsoft.com/sharepoint/v3/contenttype/forms"/>
   </ds:schemaRefs>
 </ds:datastoreItem>
 </file>
@@ -22708,9 +25245,20 @@
 </file>
 
 <file path=customXml/itemProps3.xml><?xml version="1.0" encoding="utf-8"?>
-<ds:datastoreItem xmlns:ds="http://schemas.openxmlformats.org/officeDocument/2006/customXml" ds:itemID="{38FAD308-4D6E-45DC-9A80-8E8E18C83510}">
+<ds:datastoreItem xmlns:ds="http://schemas.openxmlformats.org/officeDocument/2006/customXml" ds:itemID="{7582132D-9359-4DC4-8D90-1DE7D6586666}">
   <ds:schemaRefs>
-    <ds:schemaRef ds:uri="http://schemas.microsoft.com/sharepoint/v3/contenttype/forms"/>
+    <ds:schemaRef ds:uri="422c5ea7-0157-4c3f-8890-206c436c36de"/>
+    <ds:schemaRef ds:uri="4c59eee7-cf13-43df-b7fb-891efb139330"/>
+    <ds:schemaRef ds:uri="http://purl.org/dc/elements/1.1/"/>
+    <ds:schemaRef ds:uri="http://purl.org/dc/terms/"/>
+    <ds:schemaRef ds:uri="http://schemas.microsoft.com/internal/obd"/>
+    <ds:schemaRef ds:uri="http://schemas.microsoft.com/office/2006/documentManagement/types"/>
+    <ds:schemaRef ds:uri="http://schemas.microsoft.com/office/2006/metadata/contentType"/>
+    <ds:schemaRef ds:uri="http://schemas.microsoft.com/office/2006/metadata/properties"/>
+    <ds:schemaRef ds:uri="http://schemas.microsoft.com/office/2006/metadata/properties/metaAttributes"/>
+    <ds:schemaRef ds:uri="http://schemas.microsoft.com/office/infopath/2007/PartnerControls"/>
+    <ds:schemaRef ds:uri="http://schemas.openxmlformats.org/package/2006/metadata/core-properties"/>
+    <ds:schemaRef ds:uri="http://www.w3.org/2001/XMLSchema"/>
   </ds:schemaRefs>
 </ds:datastoreItem>
 </file>
</xml_diff>